<commit_message>
ORG-19 - finish presentation
</commit_message>
<xml_diff>
--- a/documentation/Презентация Onboard.pptx
+++ b/documentation/Презентация Onboard.pptx
@@ -311,7 +311,7 @@
             <a:pPr algn="r">
               <a:buNone/>
             </a:pPr>
-            <a:fld id="{5ED31FDE-C4E4-41CE-AADA-9BC7DA588965}" type="slidenum">
+            <a:fld id="{2A8E0877-6018-43D6-8792-8D19D148A6D8}" type="slidenum">
               <a:rPr b="0" lang="en-US" sz="1400" spc="-1" strike="noStrike">
                 <a:latin typeface="Times New Roman"/>
               </a:rPr>
@@ -359,7 +359,7 @@
         <p:spPr>
           <a:xfrm>
             <a:off x="685800" y="1143000"/>
-            <a:ext cx="5485680" cy="3085560"/>
+            <a:ext cx="5485320" cy="3085200"/>
           </a:xfrm>
           <a:prstGeom prst="rect">
             <a:avLst/>
@@ -382,7 +382,7 @@
         <p:spPr>
           <a:xfrm>
             <a:off x="685800" y="4400640"/>
-            <a:ext cx="5485680" cy="3599640"/>
+            <a:ext cx="5485320" cy="3599280"/>
           </a:xfrm>
           <a:prstGeom prst="rect">
             <a:avLst/>
@@ -416,7 +416,7 @@
         <p:spPr>
           <a:xfrm>
             <a:off x="3884760" y="8685360"/>
-            <a:ext cx="2971080" cy="457920"/>
+            <a:ext cx="2970720" cy="457560"/>
           </a:xfrm>
           <a:prstGeom prst="rect">
             <a:avLst/>
@@ -448,7 +448,7 @@
               </a:lnSpc>
               <a:buNone/>
             </a:pPr>
-            <a:fld id="{CC2A0F67-7B9C-4298-9839-29C569D17723}" type="slidenum">
+            <a:fld id="{C3FD405D-07CD-47E0-8F32-7A4010E4A429}" type="slidenum">
               <a:rPr b="0" lang="ru-RU" sz="1200" spc="-1" strike="noStrike">
                 <a:latin typeface="Times New Roman"/>
               </a:rPr>
@@ -495,7 +495,7 @@
         <p:spPr>
           <a:xfrm>
             <a:off x="685800" y="1143000"/>
-            <a:ext cx="5485680" cy="3085560"/>
+            <a:ext cx="5485320" cy="3085200"/>
           </a:xfrm>
           <a:prstGeom prst="rect">
             <a:avLst/>
@@ -518,7 +518,7 @@
         <p:spPr>
           <a:xfrm>
             <a:off x="685800" y="4400640"/>
-            <a:ext cx="5485680" cy="3599640"/>
+            <a:ext cx="5485320" cy="3599280"/>
           </a:xfrm>
           <a:prstGeom prst="rect">
             <a:avLst/>
@@ -552,7 +552,7 @@
         <p:spPr>
           <a:xfrm>
             <a:off x="3884760" y="8685360"/>
-            <a:ext cx="2971080" cy="457920"/>
+            <a:ext cx="2970720" cy="457560"/>
           </a:xfrm>
           <a:prstGeom prst="rect">
             <a:avLst/>
@@ -584,7 +584,7 @@
               </a:lnSpc>
               <a:buNone/>
             </a:pPr>
-            <a:fld id="{C55C8D5E-F6B8-468B-AE5D-42C4340D5174}" type="slidenum">
+            <a:fld id="{BF484D13-F368-4C1F-B796-2EF84BF917C3}" type="slidenum">
               <a:rPr b="0" lang="ru-RU" sz="1200" spc="-1" strike="noStrike">
                 <a:latin typeface="Times New Roman"/>
               </a:rPr>
@@ -631,7 +631,7 @@
         <p:spPr>
           <a:xfrm>
             <a:off x="685800" y="1143000"/>
-            <a:ext cx="5485680" cy="3085560"/>
+            <a:ext cx="5485320" cy="3085200"/>
           </a:xfrm>
           <a:prstGeom prst="rect">
             <a:avLst/>
@@ -654,7 +654,7 @@
         <p:spPr>
           <a:xfrm>
             <a:off x="685800" y="4400640"/>
-            <a:ext cx="5485680" cy="3599640"/>
+            <a:ext cx="5485320" cy="3599280"/>
           </a:xfrm>
           <a:prstGeom prst="rect">
             <a:avLst/>
@@ -688,7 +688,7 @@
         <p:spPr>
           <a:xfrm>
             <a:off x="3884760" y="8685360"/>
-            <a:ext cx="2971080" cy="457920"/>
+            <a:ext cx="2970720" cy="457560"/>
           </a:xfrm>
           <a:prstGeom prst="rect">
             <a:avLst/>
@@ -720,7 +720,7 @@
               </a:lnSpc>
               <a:buNone/>
             </a:pPr>
-            <a:fld id="{F0C20905-2513-4C66-85EC-3FB16089068E}" type="slidenum">
+            <a:fld id="{F1BD502D-C3DA-4887-9DB1-6006961C654E}" type="slidenum">
               <a:rPr b="0" lang="ru-RU" sz="1200" spc="-1" strike="noStrike">
                 <a:latin typeface="Times New Roman"/>
               </a:rPr>
@@ -767,7 +767,7 @@
         <p:spPr>
           <a:xfrm>
             <a:off x="685800" y="1143000"/>
-            <a:ext cx="5485680" cy="3085560"/>
+            <a:ext cx="5485320" cy="3085200"/>
           </a:xfrm>
           <a:prstGeom prst="rect">
             <a:avLst/>
@@ -790,7 +790,7 @@
         <p:spPr>
           <a:xfrm>
             <a:off x="685800" y="4400640"/>
-            <a:ext cx="5485680" cy="3599640"/>
+            <a:ext cx="5485320" cy="3599280"/>
           </a:xfrm>
           <a:prstGeom prst="rect">
             <a:avLst/>
@@ -824,7 +824,7 @@
         <p:spPr>
           <a:xfrm>
             <a:off x="3884760" y="8685360"/>
-            <a:ext cx="2971080" cy="457920"/>
+            <a:ext cx="2970720" cy="457560"/>
           </a:xfrm>
           <a:prstGeom prst="rect">
             <a:avLst/>
@@ -856,7 +856,7 @@
               </a:lnSpc>
               <a:buNone/>
             </a:pPr>
-            <a:fld id="{6E0AB173-ADC4-4873-8199-F6F26F603054}" type="slidenum">
+            <a:fld id="{A7D55D16-5D3D-44AA-B13F-EF14FF2BEDCC}" type="slidenum">
               <a:rPr b="0" lang="ru-RU" sz="1200" spc="-1" strike="noStrike">
                 <a:latin typeface="Times New Roman"/>
               </a:rPr>
@@ -903,7 +903,7 @@
         <p:spPr>
           <a:xfrm>
             <a:off x="685800" y="1143000"/>
-            <a:ext cx="5485680" cy="3085560"/>
+            <a:ext cx="5485320" cy="3085200"/>
           </a:xfrm>
           <a:prstGeom prst="rect">
             <a:avLst/>
@@ -926,7 +926,7 @@
         <p:spPr>
           <a:xfrm>
             <a:off x="685800" y="4400640"/>
-            <a:ext cx="5485680" cy="3599640"/>
+            <a:ext cx="5485320" cy="3599280"/>
           </a:xfrm>
           <a:prstGeom prst="rect">
             <a:avLst/>
@@ -960,7 +960,7 @@
         <p:spPr>
           <a:xfrm>
             <a:off x="3884760" y="8685360"/>
-            <a:ext cx="2971080" cy="457920"/>
+            <a:ext cx="2970720" cy="457560"/>
           </a:xfrm>
           <a:prstGeom prst="rect">
             <a:avLst/>
@@ -992,7 +992,7 @@
               </a:lnSpc>
               <a:buNone/>
             </a:pPr>
-            <a:fld id="{D5C7AF78-0787-4199-8F44-E968D1679512}" type="slidenum">
+            <a:fld id="{B7D67C93-CC1F-412F-8B6A-48DE3E9ECD14}" type="slidenum">
               <a:rPr b="0" lang="ru-RU" sz="1200" spc="-1" strike="noStrike">
                 <a:latin typeface="Times New Roman"/>
               </a:rPr>
@@ -1039,7 +1039,7 @@
         <p:spPr>
           <a:xfrm>
             <a:off x="685800" y="1143000"/>
-            <a:ext cx="5485680" cy="3085560"/>
+            <a:ext cx="5485320" cy="3085200"/>
           </a:xfrm>
           <a:prstGeom prst="rect">
             <a:avLst/>
@@ -1062,7 +1062,7 @@
         <p:spPr>
           <a:xfrm>
             <a:off x="685800" y="4400640"/>
-            <a:ext cx="5485680" cy="3599640"/>
+            <a:ext cx="5485320" cy="3599280"/>
           </a:xfrm>
           <a:prstGeom prst="rect">
             <a:avLst/>
@@ -1096,7 +1096,7 @@
         <p:spPr>
           <a:xfrm>
             <a:off x="3884760" y="8685360"/>
-            <a:ext cx="2971080" cy="457920"/>
+            <a:ext cx="2970720" cy="457560"/>
           </a:xfrm>
           <a:prstGeom prst="rect">
             <a:avLst/>
@@ -1128,7 +1128,7 @@
               </a:lnSpc>
               <a:buNone/>
             </a:pPr>
-            <a:fld id="{7909F110-2B26-4235-999D-52D007B8933B}" type="slidenum">
+            <a:fld id="{245E1307-23AC-4475-A896-E1F710F1EA7C}" type="slidenum">
               <a:rPr b="0" lang="ru-RU" sz="1200" spc="-1" strike="noStrike">
                 <a:latin typeface="Times New Roman"/>
               </a:rPr>
@@ -1175,7 +1175,7 @@
         <p:spPr>
           <a:xfrm>
             <a:off x="685800" y="1143000"/>
-            <a:ext cx="5485680" cy="3085560"/>
+            <a:ext cx="5485320" cy="3085200"/>
           </a:xfrm>
           <a:prstGeom prst="rect">
             <a:avLst/>
@@ -1198,7 +1198,7 @@
         <p:spPr>
           <a:xfrm>
             <a:off x="685800" y="4400640"/>
-            <a:ext cx="5485680" cy="3599640"/>
+            <a:ext cx="5485320" cy="3599280"/>
           </a:xfrm>
           <a:prstGeom prst="rect">
             <a:avLst/>
@@ -1232,7 +1232,7 @@
         <p:spPr>
           <a:xfrm>
             <a:off x="3884760" y="8685360"/>
-            <a:ext cx="2971080" cy="457920"/>
+            <a:ext cx="2970720" cy="457560"/>
           </a:xfrm>
           <a:prstGeom prst="rect">
             <a:avLst/>
@@ -1264,7 +1264,7 @@
               </a:lnSpc>
               <a:buNone/>
             </a:pPr>
-            <a:fld id="{1159539C-2178-4929-89B8-ED465E73EA39}" type="slidenum">
+            <a:fld id="{1843891A-10C0-4F1B-81EC-5273FA6BAFF2}" type="slidenum">
               <a:rPr b="0" lang="ru-RU" sz="1200" spc="-1" strike="noStrike">
                 <a:latin typeface="Times New Roman"/>
               </a:rPr>
@@ -1311,7 +1311,7 @@
         <p:spPr>
           <a:xfrm>
             <a:off x="685800" y="1143000"/>
-            <a:ext cx="5485680" cy="3085560"/>
+            <a:ext cx="5485320" cy="3085200"/>
           </a:xfrm>
           <a:prstGeom prst="rect">
             <a:avLst/>
@@ -1334,7 +1334,7 @@
         <p:spPr>
           <a:xfrm>
             <a:off x="685800" y="4400640"/>
-            <a:ext cx="5485680" cy="3599640"/>
+            <a:ext cx="5485320" cy="3599280"/>
           </a:xfrm>
           <a:prstGeom prst="rect">
             <a:avLst/>
@@ -1368,7 +1368,7 @@
         <p:spPr>
           <a:xfrm>
             <a:off x="3884760" y="8685360"/>
-            <a:ext cx="2971080" cy="457920"/>
+            <a:ext cx="2970720" cy="457560"/>
           </a:xfrm>
           <a:prstGeom prst="rect">
             <a:avLst/>
@@ -1400,7 +1400,7 @@
               </a:lnSpc>
               <a:buNone/>
             </a:pPr>
-            <a:fld id="{A59A8FAC-D5A6-4DE1-B15F-7B6CA5B17AFE}" type="slidenum">
+            <a:fld id="{C654E029-BA2C-423B-95DA-3610854DB66A}" type="slidenum">
               <a:rPr b="0" lang="ru-RU" sz="1200" spc="-1" strike="noStrike">
                 <a:latin typeface="Times New Roman"/>
               </a:rPr>
@@ -1447,7 +1447,7 @@
         <p:spPr>
           <a:xfrm>
             <a:off x="685800" y="1143000"/>
-            <a:ext cx="5485680" cy="3085560"/>
+            <a:ext cx="5485320" cy="3085200"/>
           </a:xfrm>
           <a:prstGeom prst="rect">
             <a:avLst/>
@@ -1470,7 +1470,7 @@
         <p:spPr>
           <a:xfrm>
             <a:off x="685800" y="4400640"/>
-            <a:ext cx="5485680" cy="3599640"/>
+            <a:ext cx="5485320" cy="3599280"/>
           </a:xfrm>
           <a:prstGeom prst="rect">
             <a:avLst/>
@@ -1504,7 +1504,7 @@
         <p:spPr>
           <a:xfrm>
             <a:off x="3884760" y="8685360"/>
-            <a:ext cx="2971080" cy="457920"/>
+            <a:ext cx="2970720" cy="457560"/>
           </a:xfrm>
           <a:prstGeom prst="rect">
             <a:avLst/>
@@ -1536,7 +1536,7 @@
               </a:lnSpc>
               <a:buNone/>
             </a:pPr>
-            <a:fld id="{E91FD554-6A3F-4B6D-84C5-B209B6937C72}" type="slidenum">
+            <a:fld id="{C6D17B4D-F58F-4AD0-80EB-5734800306F7}" type="slidenum">
               <a:rPr b="0" lang="ru-RU" sz="1200" spc="-1" strike="noStrike">
                 <a:latin typeface="Times New Roman"/>
               </a:rPr>
@@ -1583,7 +1583,7 @@
         <p:spPr>
           <a:xfrm>
             <a:off x="685800" y="1143000"/>
-            <a:ext cx="5485680" cy="3085560"/>
+            <a:ext cx="5485320" cy="3085200"/>
           </a:xfrm>
           <a:prstGeom prst="rect">
             <a:avLst/>
@@ -1606,7 +1606,7 @@
         <p:spPr>
           <a:xfrm>
             <a:off x="685800" y="4400640"/>
-            <a:ext cx="5485680" cy="3599640"/>
+            <a:ext cx="5485320" cy="3599280"/>
           </a:xfrm>
           <a:prstGeom prst="rect">
             <a:avLst/>
@@ -1640,7 +1640,7 @@
         <p:spPr>
           <a:xfrm>
             <a:off x="3884760" y="8685360"/>
-            <a:ext cx="2971080" cy="457920"/>
+            <a:ext cx="2970720" cy="457560"/>
           </a:xfrm>
           <a:prstGeom prst="rect">
             <a:avLst/>
@@ -1672,7 +1672,7 @@
               </a:lnSpc>
               <a:buNone/>
             </a:pPr>
-            <a:fld id="{742BE136-D54E-4AE9-AA1C-E1E9A81FC3EF}" type="slidenum">
+            <a:fld id="{DFEE8664-22D1-4F5E-A991-A895F005F356}" type="slidenum">
               <a:rPr b="0" lang="ru-RU" sz="1200" spc="-1" strike="noStrike">
                 <a:latin typeface="Times New Roman"/>
               </a:rPr>
@@ -1741,7 +1741,7 @@
         <p:spPr>
           <a:xfrm>
             <a:off x="1167480" y="1122480"/>
-            <a:ext cx="7096320" cy="2386800"/>
+            <a:ext cx="7095960" cy="2386440"/>
           </a:xfrm>
           <a:prstGeom prst="rect">
             <a:avLst/>
@@ -1778,7 +1778,7 @@
         <p:spPr>
           <a:xfrm>
             <a:off x="609480" y="1604520"/>
-            <a:ext cx="10972440" cy="1896840"/>
+            <a:ext cx="10972080" cy="1896840"/>
           </a:xfrm>
           <a:prstGeom prst="rect">
             <a:avLst/>
@@ -1812,7 +1812,7 @@
         <p:spPr>
           <a:xfrm>
             <a:off x="609480" y="3682080"/>
-            <a:ext cx="10972440" cy="1896840"/>
+            <a:ext cx="10972080" cy="1896840"/>
           </a:xfrm>
           <a:prstGeom prst="rect">
             <a:avLst/>
@@ -1868,7 +1868,7 @@
         <p:spPr>
           <a:xfrm>
             <a:off x="1167480" y="1122480"/>
-            <a:ext cx="7096320" cy="2386800"/>
+            <a:ext cx="7095960" cy="2386440"/>
           </a:xfrm>
           <a:prstGeom prst="rect">
             <a:avLst/>
@@ -2063,7 +2063,7 @@
         <p:spPr>
           <a:xfrm>
             <a:off x="1167480" y="1122480"/>
-            <a:ext cx="7096320" cy="2386800"/>
+            <a:ext cx="7095960" cy="2386440"/>
           </a:xfrm>
           <a:prstGeom prst="rect">
             <a:avLst/>
@@ -2100,7 +2100,7 @@
         <p:spPr>
           <a:xfrm>
             <a:off x="609480" y="1604520"/>
-            <a:ext cx="3533040" cy="1896840"/>
+            <a:ext cx="3532680" cy="1896840"/>
           </a:xfrm>
           <a:prstGeom prst="rect">
             <a:avLst/>
@@ -2133,8 +2133,8 @@
         </p:nvSpPr>
         <p:spPr>
           <a:xfrm>
-            <a:off x="4319640" y="1604520"/>
-            <a:ext cx="3533040" cy="1896840"/>
+            <a:off x="4319280" y="1604520"/>
+            <a:ext cx="3532680" cy="1896840"/>
           </a:xfrm>
           <a:prstGeom prst="rect">
             <a:avLst/>
@@ -2167,8 +2167,8 @@
         </p:nvSpPr>
         <p:spPr>
           <a:xfrm>
-            <a:off x="8029800" y="1604520"/>
-            <a:ext cx="3533040" cy="1896840"/>
+            <a:off x="8028720" y="1604520"/>
+            <a:ext cx="3532680" cy="1896840"/>
           </a:xfrm>
           <a:prstGeom prst="rect">
             <a:avLst/>
@@ -2202,7 +2202,7 @@
         <p:spPr>
           <a:xfrm>
             <a:off x="609480" y="3682080"/>
-            <a:ext cx="3533040" cy="1896840"/>
+            <a:ext cx="3532680" cy="1896840"/>
           </a:xfrm>
           <a:prstGeom prst="rect">
             <a:avLst/>
@@ -2235,8 +2235,8 @@
         </p:nvSpPr>
         <p:spPr>
           <a:xfrm>
-            <a:off x="4319640" y="3682080"/>
-            <a:ext cx="3533040" cy="1896840"/>
+            <a:off x="4319280" y="3682080"/>
+            <a:ext cx="3532680" cy="1896840"/>
           </a:xfrm>
           <a:prstGeom prst="rect">
             <a:avLst/>
@@ -2269,8 +2269,8 @@
         </p:nvSpPr>
         <p:spPr>
           <a:xfrm>
-            <a:off x="8029800" y="3682080"/>
-            <a:ext cx="3533040" cy="1896840"/>
+            <a:off x="8028720" y="3682080"/>
+            <a:ext cx="3532680" cy="1896840"/>
           </a:xfrm>
           <a:prstGeom prst="rect">
             <a:avLst/>
@@ -2347,7 +2347,7 @@
         <p:txBody>
           <a:bodyPr/>
           <a:p>
-            <a:fld id="{B1182A17-E229-4550-B198-ED02DA1F6004}" type="slidenum">
+            <a:fld id="{D08B9A99-1A0C-406D-8DB9-529CCD12E852}" type="slidenum">
               <a:t>&lt;#&gt;</a:t>
             </a:fld>
           </a:p>
@@ -2409,7 +2409,7 @@
         <p:spPr>
           <a:xfrm>
             <a:off x="1167480" y="1122480"/>
-            <a:ext cx="7096320" cy="2386800"/>
+            <a:ext cx="7095960" cy="2386440"/>
           </a:xfrm>
           <a:prstGeom prst="rect">
             <a:avLst/>
@@ -2446,7 +2446,7 @@
         <p:spPr>
           <a:xfrm>
             <a:off x="609480" y="1604520"/>
-            <a:ext cx="10972440" cy="3977280"/>
+            <a:ext cx="10972080" cy="3976920"/>
           </a:xfrm>
           <a:prstGeom prst="rect">
             <a:avLst/>
@@ -2504,7 +2504,7 @@
         <p:txBody>
           <a:bodyPr/>
           <a:p>
-            <a:fld id="{E506208F-2CE6-47C4-A637-AA4C45F120AD}" type="slidenum">
+            <a:fld id="{D390B374-DCCF-42FF-85D6-0EAC42375822}" type="slidenum">
               <a:t>&lt;#&gt;</a:t>
             </a:fld>
           </a:p>
@@ -2566,7 +2566,7 @@
         <p:spPr>
           <a:xfrm>
             <a:off x="1167480" y="1122480"/>
-            <a:ext cx="7096320" cy="2386800"/>
+            <a:ext cx="7095960" cy="2386440"/>
           </a:xfrm>
           <a:prstGeom prst="rect">
             <a:avLst/>
@@ -2603,7 +2603,7 @@
         <p:spPr>
           <a:xfrm>
             <a:off x="609480" y="1604520"/>
-            <a:ext cx="10972440" cy="3977280"/>
+            <a:ext cx="10972080" cy="3976920"/>
           </a:xfrm>
           <a:prstGeom prst="rect">
             <a:avLst/>
@@ -2658,7 +2658,7 @@
         <p:txBody>
           <a:bodyPr/>
           <a:p>
-            <a:fld id="{8F65A6D5-D3E0-4C65-AFE1-89ABAC38E9BE}" type="slidenum">
+            <a:fld id="{EFCF598F-FDF4-4D51-B0F5-F4C391F27968}" type="slidenum">
               <a:t>&lt;#&gt;</a:t>
             </a:fld>
           </a:p>
@@ -2720,7 +2720,7 @@
         <p:spPr>
           <a:xfrm>
             <a:off x="1167480" y="1122480"/>
-            <a:ext cx="7096320" cy="2386800"/>
+            <a:ext cx="7095960" cy="2386440"/>
           </a:xfrm>
           <a:prstGeom prst="rect">
             <a:avLst/>
@@ -2757,7 +2757,7 @@
         <p:spPr>
           <a:xfrm>
             <a:off x="609480" y="1604520"/>
-            <a:ext cx="5354280" cy="3977280"/>
+            <a:ext cx="5354280" cy="3976920"/>
           </a:xfrm>
           <a:prstGeom prst="rect">
             <a:avLst/>
@@ -2791,7 +2791,7 @@
         <p:spPr>
           <a:xfrm>
             <a:off x="6231960" y="1604520"/>
-            <a:ext cx="5354280" cy="3977280"/>
+            <a:ext cx="5354280" cy="3976920"/>
           </a:xfrm>
           <a:prstGeom prst="rect">
             <a:avLst/>
@@ -2846,7 +2846,7 @@
         <p:txBody>
           <a:bodyPr/>
           <a:p>
-            <a:fld id="{C24682C4-08E5-4F01-A79D-3AFFE668FD51}" type="slidenum">
+            <a:fld id="{4BF62E11-47F9-499E-864F-57D31E41C8C0}" type="slidenum">
               <a:t>&lt;#&gt;</a:t>
             </a:fld>
           </a:p>
@@ -2908,7 +2908,7 @@
         <p:spPr>
           <a:xfrm>
             <a:off x="1167480" y="1122480"/>
-            <a:ext cx="7096320" cy="2386800"/>
+            <a:ext cx="7095960" cy="2386440"/>
           </a:xfrm>
           <a:prstGeom prst="rect">
             <a:avLst/>
@@ -2966,7 +2966,7 @@
         <p:txBody>
           <a:bodyPr/>
           <a:p>
-            <a:fld id="{7C35B83B-8CA3-46B1-8703-91CD5074E81A}" type="slidenum">
+            <a:fld id="{67A3AADD-1E84-4437-A45F-3D04DAF9EF16}" type="slidenum">
               <a:t>&lt;#&gt;</a:t>
             </a:fld>
           </a:p>
@@ -3028,7 +3028,7 @@
         <p:spPr>
           <a:xfrm>
             <a:off x="1167480" y="1122480"/>
-            <a:ext cx="7096320" cy="11064960"/>
+            <a:ext cx="7095960" cy="11063520"/>
           </a:xfrm>
           <a:prstGeom prst="rect">
             <a:avLst/>
@@ -3086,7 +3086,7 @@
         <p:txBody>
           <a:bodyPr/>
           <a:p>
-            <a:fld id="{939D9454-B24E-4EBF-958F-0B59590EF7D5}" type="slidenum">
+            <a:fld id="{D2E48699-B328-4360-9030-8146CEB2C58E}" type="slidenum">
               <a:t>&lt;#&gt;</a:t>
             </a:fld>
           </a:p>
@@ -3148,7 +3148,7 @@
         <p:spPr>
           <a:xfrm>
             <a:off x="1167480" y="1122480"/>
-            <a:ext cx="7096320" cy="2386800"/>
+            <a:ext cx="7095960" cy="2386440"/>
           </a:xfrm>
           <a:prstGeom prst="rect">
             <a:avLst/>
@@ -3219,7 +3219,7 @@
         <p:spPr>
           <a:xfrm>
             <a:off x="6231960" y="1604520"/>
-            <a:ext cx="5354280" cy="3977280"/>
+            <a:ext cx="5354280" cy="3976920"/>
           </a:xfrm>
           <a:prstGeom prst="rect">
             <a:avLst/>
@@ -3308,7 +3308,7 @@
         <p:txBody>
           <a:bodyPr/>
           <a:p>
-            <a:fld id="{4B1AD251-2E1B-45C7-A7C4-C369E10F4A85}" type="slidenum">
+            <a:fld id="{CE63F4D1-719D-4FB2-8325-8F7AAB1859A3}" type="slidenum">
               <a:t>&lt;#&gt;</a:t>
             </a:fld>
           </a:p>
@@ -3370,7 +3370,7 @@
         <p:spPr>
           <a:xfrm>
             <a:off x="1167480" y="1122480"/>
-            <a:ext cx="7096320" cy="2386800"/>
+            <a:ext cx="7095960" cy="2386440"/>
           </a:xfrm>
           <a:prstGeom prst="rect">
             <a:avLst/>
@@ -3407,7 +3407,7 @@
         <p:spPr>
           <a:xfrm>
             <a:off x="609480" y="1604520"/>
-            <a:ext cx="10972440" cy="3977280"/>
+            <a:ext cx="10972080" cy="3976920"/>
           </a:xfrm>
           <a:prstGeom prst="rect">
             <a:avLst/>
@@ -3466,7 +3466,7 @@
         <p:spPr>
           <a:xfrm>
             <a:off x="1167480" y="1122480"/>
-            <a:ext cx="7096320" cy="2386800"/>
+            <a:ext cx="7095960" cy="2386440"/>
           </a:xfrm>
           <a:prstGeom prst="rect">
             <a:avLst/>
@@ -3503,7 +3503,7 @@
         <p:spPr>
           <a:xfrm>
             <a:off x="609480" y="1604520"/>
-            <a:ext cx="5354280" cy="3977280"/>
+            <a:ext cx="5354280" cy="3976920"/>
           </a:xfrm>
           <a:prstGeom prst="rect">
             <a:avLst/>
@@ -3626,7 +3626,7 @@
         <p:txBody>
           <a:bodyPr/>
           <a:p>
-            <a:fld id="{D37EF514-39DF-4556-8E8B-E8C96CD6AC58}" type="slidenum">
+            <a:fld id="{4FEC9639-87DB-4052-AEED-1E1F5A267B98}" type="slidenum">
               <a:t>&lt;#&gt;</a:t>
             </a:fld>
           </a:p>
@@ -3688,7 +3688,7 @@
         <p:spPr>
           <a:xfrm>
             <a:off x="1167480" y="1122480"/>
-            <a:ext cx="7096320" cy="2386800"/>
+            <a:ext cx="7095960" cy="2386440"/>
           </a:xfrm>
           <a:prstGeom prst="rect">
             <a:avLst/>
@@ -3793,7 +3793,7 @@
         <p:spPr>
           <a:xfrm>
             <a:off x="609480" y="3682080"/>
-            <a:ext cx="10972440" cy="1896840"/>
+            <a:ext cx="10972080" cy="1896840"/>
           </a:xfrm>
           <a:prstGeom prst="rect">
             <a:avLst/>
@@ -3848,7 +3848,7 @@
         <p:txBody>
           <a:bodyPr/>
           <a:p>
-            <a:fld id="{C7647F43-B552-472B-9007-A8D38530D4E7}" type="slidenum">
+            <a:fld id="{AF3CD282-02B2-4510-A6A4-0C0CDD10E206}" type="slidenum">
               <a:t>&lt;#&gt;</a:t>
             </a:fld>
           </a:p>
@@ -3910,7 +3910,7 @@
         <p:spPr>
           <a:xfrm>
             <a:off x="1167480" y="1122480"/>
-            <a:ext cx="7096320" cy="2386800"/>
+            <a:ext cx="7095960" cy="2386440"/>
           </a:xfrm>
           <a:prstGeom prst="rect">
             <a:avLst/>
@@ -3947,7 +3947,7 @@
         <p:spPr>
           <a:xfrm>
             <a:off x="609480" y="1604520"/>
-            <a:ext cx="10972440" cy="1896840"/>
+            <a:ext cx="10972080" cy="1896840"/>
           </a:xfrm>
           <a:prstGeom prst="rect">
             <a:avLst/>
@@ -3981,7 +3981,7 @@
         <p:spPr>
           <a:xfrm>
             <a:off x="609480" y="3682080"/>
-            <a:ext cx="10972440" cy="1896840"/>
+            <a:ext cx="10972080" cy="1896840"/>
           </a:xfrm>
           <a:prstGeom prst="rect">
             <a:avLst/>
@@ -4036,7 +4036,7 @@
         <p:txBody>
           <a:bodyPr/>
           <a:p>
-            <a:fld id="{AE38293E-B413-49AD-8C95-41501D4FF5FC}" type="slidenum">
+            <a:fld id="{7E335D4A-8677-4ED3-9B92-E9EAD2D12353}" type="slidenum">
               <a:t>&lt;#&gt;</a:t>
             </a:fld>
           </a:p>
@@ -4098,7 +4098,7 @@
         <p:spPr>
           <a:xfrm>
             <a:off x="1167480" y="1122480"/>
-            <a:ext cx="7096320" cy="2386800"/>
+            <a:ext cx="7095960" cy="2386440"/>
           </a:xfrm>
           <a:prstGeom prst="rect">
             <a:avLst/>
@@ -4292,7 +4292,7 @@
         <p:txBody>
           <a:bodyPr/>
           <a:p>
-            <a:fld id="{C104BA76-9CD1-4FEB-A03D-5E4E02754356}" type="slidenum">
+            <a:fld id="{F3D0134F-8FAE-407B-80AE-7CF52B851FB9}" type="slidenum">
               <a:t>&lt;#&gt;</a:t>
             </a:fld>
           </a:p>
@@ -4354,7 +4354,7 @@
         <p:spPr>
           <a:xfrm>
             <a:off x="1167480" y="1122480"/>
-            <a:ext cx="7096320" cy="2386800"/>
+            <a:ext cx="7095960" cy="2386440"/>
           </a:xfrm>
           <a:prstGeom prst="rect">
             <a:avLst/>
@@ -4391,7 +4391,7 @@
         <p:spPr>
           <a:xfrm>
             <a:off x="609480" y="1604520"/>
-            <a:ext cx="3533040" cy="1896840"/>
+            <a:ext cx="3532680" cy="1896840"/>
           </a:xfrm>
           <a:prstGeom prst="rect">
             <a:avLst/>
@@ -4424,8 +4424,8 @@
         </p:nvSpPr>
         <p:spPr>
           <a:xfrm>
-            <a:off x="4319640" y="1604520"/>
-            <a:ext cx="3533040" cy="1896840"/>
+            <a:off x="4319280" y="1604520"/>
+            <a:ext cx="3532680" cy="1896840"/>
           </a:xfrm>
           <a:prstGeom prst="rect">
             <a:avLst/>
@@ -4458,8 +4458,8 @@
         </p:nvSpPr>
         <p:spPr>
           <a:xfrm>
-            <a:off x="8029800" y="1604520"/>
-            <a:ext cx="3533040" cy="1896840"/>
+            <a:off x="8028720" y="1604520"/>
+            <a:ext cx="3532680" cy="1896840"/>
           </a:xfrm>
           <a:prstGeom prst="rect">
             <a:avLst/>
@@ -4493,7 +4493,7 @@
         <p:spPr>
           <a:xfrm>
             <a:off x="609480" y="3682080"/>
-            <a:ext cx="3533040" cy="1896840"/>
+            <a:ext cx="3532680" cy="1896840"/>
           </a:xfrm>
           <a:prstGeom prst="rect">
             <a:avLst/>
@@ -4526,8 +4526,8 @@
         </p:nvSpPr>
         <p:spPr>
           <a:xfrm>
-            <a:off x="4319640" y="3682080"/>
-            <a:ext cx="3533040" cy="1896840"/>
+            <a:off x="4319280" y="3682080"/>
+            <a:ext cx="3532680" cy="1896840"/>
           </a:xfrm>
           <a:prstGeom prst="rect">
             <a:avLst/>
@@ -4560,8 +4560,8 @@
         </p:nvSpPr>
         <p:spPr>
           <a:xfrm>
-            <a:off x="8029800" y="3682080"/>
-            <a:ext cx="3533040" cy="1896840"/>
+            <a:off x="8028720" y="3682080"/>
+            <a:ext cx="3532680" cy="1896840"/>
           </a:xfrm>
           <a:prstGeom prst="rect">
             <a:avLst/>
@@ -4616,7 +4616,7 @@
         <p:txBody>
           <a:bodyPr/>
           <a:p>
-            <a:fld id="{D413941C-0A40-44C8-8286-078F9E63D098}" type="slidenum">
+            <a:fld id="{D244B889-7BEA-49ED-861F-82D4A208536E}" type="slidenum">
               <a:t>&lt;#&gt;</a:t>
             </a:fld>
           </a:p>
@@ -4699,7 +4699,7 @@
         <p:txBody>
           <a:bodyPr/>
           <a:p>
-            <a:fld id="{82679798-E998-4EEE-B941-6C0BE03A8111}" type="slidenum">
+            <a:fld id="{64B43061-2B50-4E08-83D8-26E2680531A7}" type="slidenum">
               <a:t>&lt;#&gt;</a:t>
             </a:fld>
           </a:p>
@@ -4761,7 +4761,7 @@
         <p:spPr>
           <a:xfrm>
             <a:off x="1167480" y="1122480"/>
-            <a:ext cx="7096320" cy="2386800"/>
+            <a:ext cx="7095960" cy="2386440"/>
           </a:xfrm>
           <a:prstGeom prst="rect">
             <a:avLst/>
@@ -4798,7 +4798,7 @@
         <p:spPr>
           <a:xfrm>
             <a:off x="609480" y="1604520"/>
-            <a:ext cx="10972440" cy="3977280"/>
+            <a:ext cx="10972080" cy="3976920"/>
           </a:xfrm>
           <a:prstGeom prst="rect">
             <a:avLst/>
@@ -4856,7 +4856,7 @@
         <p:txBody>
           <a:bodyPr/>
           <a:p>
-            <a:fld id="{54C95F51-6C33-4E8E-9AB9-5DF26BD9CB76}" type="slidenum">
+            <a:fld id="{65D089CE-8529-4624-B7E5-FEB365DBD347}" type="slidenum">
               <a:t>&lt;#&gt;</a:t>
             </a:fld>
           </a:p>
@@ -4918,7 +4918,7 @@
         <p:spPr>
           <a:xfrm>
             <a:off x="1167480" y="1122480"/>
-            <a:ext cx="7096320" cy="2386800"/>
+            <a:ext cx="7095960" cy="2386440"/>
           </a:xfrm>
           <a:prstGeom prst="rect">
             <a:avLst/>
@@ -4955,7 +4955,7 @@
         <p:spPr>
           <a:xfrm>
             <a:off x="609480" y="1604520"/>
-            <a:ext cx="10972440" cy="3977280"/>
+            <a:ext cx="10972080" cy="3976920"/>
           </a:xfrm>
           <a:prstGeom prst="rect">
             <a:avLst/>
@@ -5010,7 +5010,7 @@
         <p:txBody>
           <a:bodyPr/>
           <a:p>
-            <a:fld id="{93CF8B1E-0341-4770-B409-4CD917EDE1CB}" type="slidenum">
+            <a:fld id="{A2EACACB-DA2F-433F-BA9B-59C879C084D7}" type="slidenum">
               <a:t>&lt;#&gt;</a:t>
             </a:fld>
           </a:p>
@@ -5072,7 +5072,7 @@
         <p:spPr>
           <a:xfrm>
             <a:off x="1167480" y="1122480"/>
-            <a:ext cx="7096320" cy="2386800"/>
+            <a:ext cx="7095960" cy="2386440"/>
           </a:xfrm>
           <a:prstGeom prst="rect">
             <a:avLst/>
@@ -5109,7 +5109,7 @@
         <p:spPr>
           <a:xfrm>
             <a:off x="609480" y="1604520"/>
-            <a:ext cx="5354280" cy="3977280"/>
+            <a:ext cx="5354280" cy="3976920"/>
           </a:xfrm>
           <a:prstGeom prst="rect">
             <a:avLst/>
@@ -5143,7 +5143,7 @@
         <p:spPr>
           <a:xfrm>
             <a:off x="6231960" y="1604520"/>
-            <a:ext cx="5354280" cy="3977280"/>
+            <a:ext cx="5354280" cy="3976920"/>
           </a:xfrm>
           <a:prstGeom prst="rect">
             <a:avLst/>
@@ -5198,7 +5198,7 @@
         <p:txBody>
           <a:bodyPr/>
           <a:p>
-            <a:fld id="{B575F6E7-2410-474D-A975-FDCA4DB283F6}" type="slidenum">
+            <a:fld id="{072B5B50-1C2A-4D23-8CCD-9A969CE4C25A}" type="slidenum">
               <a:t>&lt;#&gt;</a:t>
             </a:fld>
           </a:p>
@@ -5260,7 +5260,7 @@
         <p:spPr>
           <a:xfrm>
             <a:off x="1167480" y="1122480"/>
-            <a:ext cx="7096320" cy="2386800"/>
+            <a:ext cx="7095960" cy="2386440"/>
           </a:xfrm>
           <a:prstGeom prst="rect">
             <a:avLst/>
@@ -5318,7 +5318,7 @@
         <p:txBody>
           <a:bodyPr/>
           <a:p>
-            <a:fld id="{4CDAE89A-5BAB-4229-9489-FE262951A09F}" type="slidenum">
+            <a:fld id="{7810FAC6-3D42-4183-B015-098946D76C45}" type="slidenum">
               <a:t>&lt;#&gt;</a:t>
             </a:fld>
           </a:p>
@@ -5380,7 +5380,7 @@
         <p:spPr>
           <a:xfrm>
             <a:off x="1167480" y="1122480"/>
-            <a:ext cx="7096320" cy="2386800"/>
+            <a:ext cx="7095960" cy="2386440"/>
           </a:xfrm>
           <a:prstGeom prst="rect">
             <a:avLst/>
@@ -5417,7 +5417,7 @@
         <p:spPr>
           <a:xfrm>
             <a:off x="609480" y="1604520"/>
-            <a:ext cx="10972440" cy="3977280"/>
+            <a:ext cx="10972080" cy="3976920"/>
           </a:xfrm>
           <a:prstGeom prst="rect">
             <a:avLst/>
@@ -5473,7 +5473,7 @@
         <p:spPr>
           <a:xfrm>
             <a:off x="1167480" y="1122480"/>
-            <a:ext cx="7096320" cy="11064960"/>
+            <a:ext cx="7095960" cy="11063520"/>
           </a:xfrm>
           <a:prstGeom prst="rect">
             <a:avLst/>
@@ -5531,7 +5531,7 @@
         <p:txBody>
           <a:bodyPr/>
           <a:p>
-            <a:fld id="{C8975E97-050F-4C73-AE7C-4AE8BA86BF68}" type="slidenum">
+            <a:fld id="{0028AD1F-D89E-4757-B228-AD67E5005544}" type="slidenum">
               <a:t>&lt;#&gt;</a:t>
             </a:fld>
           </a:p>
@@ -5593,7 +5593,7 @@
         <p:spPr>
           <a:xfrm>
             <a:off x="1167480" y="1122480"/>
-            <a:ext cx="7096320" cy="2386800"/>
+            <a:ext cx="7095960" cy="2386440"/>
           </a:xfrm>
           <a:prstGeom prst="rect">
             <a:avLst/>
@@ -5664,7 +5664,7 @@
         <p:spPr>
           <a:xfrm>
             <a:off x="6231960" y="1604520"/>
-            <a:ext cx="5354280" cy="3977280"/>
+            <a:ext cx="5354280" cy="3976920"/>
           </a:xfrm>
           <a:prstGeom prst="rect">
             <a:avLst/>
@@ -5753,7 +5753,7 @@
         <p:txBody>
           <a:bodyPr/>
           <a:p>
-            <a:fld id="{DBBC80CE-0084-4A1C-A999-5EDE43CED097}" type="slidenum">
+            <a:fld id="{F3C1421C-6903-4819-9CA3-6F971B5FBE55}" type="slidenum">
               <a:t>&lt;#&gt;</a:t>
             </a:fld>
           </a:p>
@@ -5815,7 +5815,7 @@
         <p:spPr>
           <a:xfrm>
             <a:off x="1167480" y="1122480"/>
-            <a:ext cx="7096320" cy="2386800"/>
+            <a:ext cx="7095960" cy="2386440"/>
           </a:xfrm>
           <a:prstGeom prst="rect">
             <a:avLst/>
@@ -5852,7 +5852,7 @@
         <p:spPr>
           <a:xfrm>
             <a:off x="609480" y="1604520"/>
-            <a:ext cx="5354280" cy="3977280"/>
+            <a:ext cx="5354280" cy="3976920"/>
           </a:xfrm>
           <a:prstGeom prst="rect">
             <a:avLst/>
@@ -5975,7 +5975,7 @@
         <p:txBody>
           <a:bodyPr/>
           <a:p>
-            <a:fld id="{8DD38639-375A-428A-83A7-5357FEF71F91}" type="slidenum">
+            <a:fld id="{A9C32881-1F4E-487F-B45B-4E1B1E31E36F}" type="slidenum">
               <a:t>&lt;#&gt;</a:t>
             </a:fld>
           </a:p>
@@ -6037,7 +6037,7 @@
         <p:spPr>
           <a:xfrm>
             <a:off x="1167480" y="1122480"/>
-            <a:ext cx="7096320" cy="2386800"/>
+            <a:ext cx="7095960" cy="2386440"/>
           </a:xfrm>
           <a:prstGeom prst="rect">
             <a:avLst/>
@@ -6142,7 +6142,7 @@
         <p:spPr>
           <a:xfrm>
             <a:off x="609480" y="3682080"/>
-            <a:ext cx="10972440" cy="1896840"/>
+            <a:ext cx="10972080" cy="1896840"/>
           </a:xfrm>
           <a:prstGeom prst="rect">
             <a:avLst/>
@@ -6197,7 +6197,7 @@
         <p:txBody>
           <a:bodyPr/>
           <a:p>
-            <a:fld id="{CA597432-12D6-4496-8A34-8D73ED7FF41A}" type="slidenum">
+            <a:fld id="{75CA3DAD-1F0C-4BF5-B3CD-D3AA5F984326}" type="slidenum">
               <a:t>&lt;#&gt;</a:t>
             </a:fld>
           </a:p>
@@ -6259,7 +6259,7 @@
         <p:spPr>
           <a:xfrm>
             <a:off x="1167480" y="1122480"/>
-            <a:ext cx="7096320" cy="2386800"/>
+            <a:ext cx="7095960" cy="2386440"/>
           </a:xfrm>
           <a:prstGeom prst="rect">
             <a:avLst/>
@@ -6296,7 +6296,7 @@
         <p:spPr>
           <a:xfrm>
             <a:off x="609480" y="1604520"/>
-            <a:ext cx="10972440" cy="1896840"/>
+            <a:ext cx="10972080" cy="1896840"/>
           </a:xfrm>
           <a:prstGeom prst="rect">
             <a:avLst/>
@@ -6330,7 +6330,7 @@
         <p:spPr>
           <a:xfrm>
             <a:off x="609480" y="3682080"/>
-            <a:ext cx="10972440" cy="1896840"/>
+            <a:ext cx="10972080" cy="1896840"/>
           </a:xfrm>
           <a:prstGeom prst="rect">
             <a:avLst/>
@@ -6385,7 +6385,7 @@
         <p:txBody>
           <a:bodyPr/>
           <a:p>
-            <a:fld id="{9F691A30-20A4-49E2-A820-F4117EFF2454}" type="slidenum">
+            <a:fld id="{17973589-F3B9-40B0-9099-87B762D485CC}" type="slidenum">
               <a:t>&lt;#&gt;</a:t>
             </a:fld>
           </a:p>
@@ -6447,7 +6447,7 @@
         <p:spPr>
           <a:xfrm>
             <a:off x="1167480" y="1122480"/>
-            <a:ext cx="7096320" cy="2386800"/>
+            <a:ext cx="7095960" cy="2386440"/>
           </a:xfrm>
           <a:prstGeom prst="rect">
             <a:avLst/>
@@ -6641,7 +6641,7 @@
         <p:txBody>
           <a:bodyPr/>
           <a:p>
-            <a:fld id="{C826AEA8-74E0-4A32-A80A-0C1A23E14A12}" type="slidenum">
+            <a:fld id="{8E3279AE-D5B3-4C5C-AC00-D5FB16977C36}" type="slidenum">
               <a:t>&lt;#&gt;</a:t>
             </a:fld>
           </a:p>
@@ -6703,7 +6703,7 @@
         <p:spPr>
           <a:xfrm>
             <a:off x="1167480" y="1122480"/>
-            <a:ext cx="7096320" cy="2386800"/>
+            <a:ext cx="7095960" cy="2386440"/>
           </a:xfrm>
           <a:prstGeom prst="rect">
             <a:avLst/>
@@ -6740,7 +6740,7 @@
         <p:spPr>
           <a:xfrm>
             <a:off x="609480" y="1604520"/>
-            <a:ext cx="3533040" cy="1896840"/>
+            <a:ext cx="3532680" cy="1896840"/>
           </a:xfrm>
           <a:prstGeom prst="rect">
             <a:avLst/>
@@ -6773,8 +6773,8 @@
         </p:nvSpPr>
         <p:spPr>
           <a:xfrm>
-            <a:off x="4319640" y="1604520"/>
-            <a:ext cx="3533040" cy="1896840"/>
+            <a:off x="4319280" y="1604520"/>
+            <a:ext cx="3532680" cy="1896840"/>
           </a:xfrm>
           <a:prstGeom prst="rect">
             <a:avLst/>
@@ -6807,8 +6807,8 @@
         </p:nvSpPr>
         <p:spPr>
           <a:xfrm>
-            <a:off x="8029800" y="1604520"/>
-            <a:ext cx="3533040" cy="1896840"/>
+            <a:off x="8028720" y="1604520"/>
+            <a:ext cx="3532680" cy="1896840"/>
           </a:xfrm>
           <a:prstGeom prst="rect">
             <a:avLst/>
@@ -6842,7 +6842,7 @@
         <p:spPr>
           <a:xfrm>
             <a:off x="609480" y="3682080"/>
-            <a:ext cx="3533040" cy="1896840"/>
+            <a:ext cx="3532680" cy="1896840"/>
           </a:xfrm>
           <a:prstGeom prst="rect">
             <a:avLst/>
@@ -6875,8 +6875,8 @@
         </p:nvSpPr>
         <p:spPr>
           <a:xfrm>
-            <a:off x="4319640" y="3682080"/>
-            <a:ext cx="3533040" cy="1896840"/>
+            <a:off x="4319280" y="3682080"/>
+            <a:ext cx="3532680" cy="1896840"/>
           </a:xfrm>
           <a:prstGeom prst="rect">
             <a:avLst/>
@@ -6909,8 +6909,8 @@
         </p:nvSpPr>
         <p:spPr>
           <a:xfrm>
-            <a:off x="8029800" y="3682080"/>
-            <a:ext cx="3533040" cy="1896840"/>
+            <a:off x="8028720" y="3682080"/>
+            <a:ext cx="3532680" cy="1896840"/>
           </a:xfrm>
           <a:prstGeom prst="rect">
             <a:avLst/>
@@ -6965,7 +6965,7 @@
         <p:txBody>
           <a:bodyPr/>
           <a:p>
-            <a:fld id="{13C46B7D-2123-4AC6-881B-0169E6E079FF}" type="slidenum">
+            <a:fld id="{C0CED8B5-6B98-415C-9100-D0CAA1C45AFD}" type="slidenum">
               <a:t>&lt;#&gt;</a:t>
             </a:fld>
           </a:p>
@@ -7048,7 +7048,7 @@
         <p:txBody>
           <a:bodyPr/>
           <a:p>
-            <a:fld id="{37175D2F-36D2-4312-89AB-91B425D6C619}" type="slidenum">
+            <a:fld id="{68BD7587-09D3-4EBD-8BF2-939A45FCE9FB}" type="slidenum">
               <a:t>&lt;#&gt;</a:t>
             </a:fld>
           </a:p>
@@ -7110,7 +7110,7 @@
         <p:spPr>
           <a:xfrm>
             <a:off x="1167480" y="1122480"/>
-            <a:ext cx="7096320" cy="2386800"/>
+            <a:ext cx="7095960" cy="2386440"/>
           </a:xfrm>
           <a:prstGeom prst="rect">
             <a:avLst/>
@@ -7147,7 +7147,7 @@
         <p:spPr>
           <a:xfrm>
             <a:off x="609480" y="1604520"/>
-            <a:ext cx="10972440" cy="3977280"/>
+            <a:ext cx="10972080" cy="3976920"/>
           </a:xfrm>
           <a:prstGeom prst="rect">
             <a:avLst/>
@@ -7205,7 +7205,7 @@
         <p:txBody>
           <a:bodyPr/>
           <a:p>
-            <a:fld id="{5B6FF29B-2164-43C6-9ABE-4A456B01B027}" type="slidenum">
+            <a:fld id="{A6FF67D6-38CB-44F7-9293-A0EA9CFF43DC}" type="slidenum">
               <a:t>&lt;#&gt;</a:t>
             </a:fld>
           </a:p>
@@ -7267,7 +7267,7 @@
         <p:spPr>
           <a:xfrm>
             <a:off x="1167480" y="1122480"/>
-            <a:ext cx="7096320" cy="2386800"/>
+            <a:ext cx="7095960" cy="2386440"/>
           </a:xfrm>
           <a:prstGeom prst="rect">
             <a:avLst/>
@@ -7304,7 +7304,7 @@
         <p:spPr>
           <a:xfrm>
             <a:off x="609480" y="1604520"/>
-            <a:ext cx="10972440" cy="3977280"/>
+            <a:ext cx="10972080" cy="3976920"/>
           </a:xfrm>
           <a:prstGeom prst="rect">
             <a:avLst/>
@@ -7359,7 +7359,7 @@
         <p:txBody>
           <a:bodyPr/>
           <a:p>
-            <a:fld id="{629931CB-5420-40ED-9BA9-D79C63B3A09D}" type="slidenum">
+            <a:fld id="{3DCF0AE7-0C39-4D41-8447-3D73F54F1CC4}" type="slidenum">
               <a:t>&lt;#&gt;</a:t>
             </a:fld>
           </a:p>
@@ -7421,7 +7421,7 @@
         <p:spPr>
           <a:xfrm>
             <a:off x="1167480" y="1122480"/>
-            <a:ext cx="7096320" cy="2386800"/>
+            <a:ext cx="7095960" cy="2386440"/>
           </a:xfrm>
           <a:prstGeom prst="rect">
             <a:avLst/>
@@ -7458,7 +7458,7 @@
         <p:spPr>
           <a:xfrm>
             <a:off x="609480" y="1604520"/>
-            <a:ext cx="5354280" cy="3977280"/>
+            <a:ext cx="5354280" cy="3976920"/>
           </a:xfrm>
           <a:prstGeom prst="rect">
             <a:avLst/>
@@ -7492,7 +7492,7 @@
         <p:spPr>
           <a:xfrm>
             <a:off x="6231960" y="1604520"/>
-            <a:ext cx="5354280" cy="3977280"/>
+            <a:ext cx="5354280" cy="3976920"/>
           </a:xfrm>
           <a:prstGeom prst="rect">
             <a:avLst/>
@@ -7548,7 +7548,7 @@
         <p:spPr>
           <a:xfrm>
             <a:off x="1167480" y="1122480"/>
-            <a:ext cx="7096320" cy="2386800"/>
+            <a:ext cx="7095960" cy="2386440"/>
           </a:xfrm>
           <a:prstGeom prst="rect">
             <a:avLst/>
@@ -7585,7 +7585,7 @@
         <p:spPr>
           <a:xfrm>
             <a:off x="609480" y="1604520"/>
-            <a:ext cx="5354280" cy="3977280"/>
+            <a:ext cx="5354280" cy="3976920"/>
           </a:xfrm>
           <a:prstGeom prst="rect">
             <a:avLst/>
@@ -7619,7 +7619,7 @@
         <p:spPr>
           <a:xfrm>
             <a:off x="6231960" y="1604520"/>
-            <a:ext cx="5354280" cy="3977280"/>
+            <a:ext cx="5354280" cy="3976920"/>
           </a:xfrm>
           <a:prstGeom prst="rect">
             <a:avLst/>
@@ -7674,7 +7674,7 @@
         <p:txBody>
           <a:bodyPr/>
           <a:p>
-            <a:fld id="{4D4E05F2-ABEE-4501-BD8E-423C08CC3C5E}" type="slidenum">
+            <a:fld id="{67393C7F-A070-40F4-8861-B4094F4A5663}" type="slidenum">
               <a:t>&lt;#&gt;</a:t>
             </a:fld>
           </a:p>
@@ -7736,7 +7736,7 @@
         <p:spPr>
           <a:xfrm>
             <a:off x="1167480" y="1122480"/>
-            <a:ext cx="7096320" cy="2386800"/>
+            <a:ext cx="7095960" cy="2386440"/>
           </a:xfrm>
           <a:prstGeom prst="rect">
             <a:avLst/>
@@ -7794,7 +7794,7 @@
         <p:txBody>
           <a:bodyPr/>
           <a:p>
-            <a:fld id="{1224FF67-7B2F-44C0-B918-1A86C3802A73}" type="slidenum">
+            <a:fld id="{B5BE0D05-83B8-4A03-A1E7-2BA236024DA6}" type="slidenum">
               <a:t>&lt;#&gt;</a:t>
             </a:fld>
           </a:p>
@@ -7856,7 +7856,7 @@
         <p:spPr>
           <a:xfrm>
             <a:off x="1167480" y="1122480"/>
-            <a:ext cx="7096320" cy="11064960"/>
+            <a:ext cx="7095960" cy="11063520"/>
           </a:xfrm>
           <a:prstGeom prst="rect">
             <a:avLst/>
@@ -7914,7 +7914,7 @@
         <p:txBody>
           <a:bodyPr/>
           <a:p>
-            <a:fld id="{1CCF67A8-C57A-49D7-999A-286E4E1731E0}" type="slidenum">
+            <a:fld id="{959BF9DC-28DC-426A-8ABD-507A8D5E3906}" type="slidenum">
               <a:t>&lt;#&gt;</a:t>
             </a:fld>
           </a:p>
@@ -7976,7 +7976,7 @@
         <p:spPr>
           <a:xfrm>
             <a:off x="1167480" y="1122480"/>
-            <a:ext cx="7096320" cy="2386800"/>
+            <a:ext cx="7095960" cy="2386440"/>
           </a:xfrm>
           <a:prstGeom prst="rect">
             <a:avLst/>
@@ -8047,7 +8047,7 @@
         <p:spPr>
           <a:xfrm>
             <a:off x="6231960" y="1604520"/>
-            <a:ext cx="5354280" cy="3977280"/>
+            <a:ext cx="5354280" cy="3976920"/>
           </a:xfrm>
           <a:prstGeom prst="rect">
             <a:avLst/>
@@ -8136,7 +8136,7 @@
         <p:txBody>
           <a:bodyPr/>
           <a:p>
-            <a:fld id="{9F036C29-79AE-44CE-B907-D8673425C4FB}" type="slidenum">
+            <a:fld id="{77EE8EED-4001-44C5-8730-0063592EB17C}" type="slidenum">
               <a:t>&lt;#&gt;</a:t>
             </a:fld>
           </a:p>
@@ -8198,7 +8198,7 @@
         <p:spPr>
           <a:xfrm>
             <a:off x="1167480" y="1122480"/>
-            <a:ext cx="7096320" cy="2386800"/>
+            <a:ext cx="7095960" cy="2386440"/>
           </a:xfrm>
           <a:prstGeom prst="rect">
             <a:avLst/>
@@ -8235,7 +8235,7 @@
         <p:spPr>
           <a:xfrm>
             <a:off x="609480" y="1604520"/>
-            <a:ext cx="5354280" cy="3977280"/>
+            <a:ext cx="5354280" cy="3976920"/>
           </a:xfrm>
           <a:prstGeom prst="rect">
             <a:avLst/>
@@ -8358,7 +8358,7 @@
         <p:txBody>
           <a:bodyPr/>
           <a:p>
-            <a:fld id="{3666970F-43A6-4A41-B5B0-09819EBB1989}" type="slidenum">
+            <a:fld id="{5F66A9E5-232D-4D08-A832-AEDC0172C907}" type="slidenum">
               <a:t>&lt;#&gt;</a:t>
             </a:fld>
           </a:p>
@@ -8420,7 +8420,7 @@
         <p:spPr>
           <a:xfrm>
             <a:off x="1167480" y="1122480"/>
-            <a:ext cx="7096320" cy="2386800"/>
+            <a:ext cx="7095960" cy="2386440"/>
           </a:xfrm>
           <a:prstGeom prst="rect">
             <a:avLst/>
@@ -8525,7 +8525,7 @@
         <p:spPr>
           <a:xfrm>
             <a:off x="609480" y="3682080"/>
-            <a:ext cx="10972440" cy="1896840"/>
+            <a:ext cx="10972080" cy="1896840"/>
           </a:xfrm>
           <a:prstGeom prst="rect">
             <a:avLst/>
@@ -8580,7 +8580,7 @@
         <p:txBody>
           <a:bodyPr/>
           <a:p>
-            <a:fld id="{377E7FD0-6AB9-4E80-99D2-EA6C20BE9C62}" type="slidenum">
+            <a:fld id="{BBB2C887-89C4-4533-818F-832BA6BC05FA}" type="slidenum">
               <a:t>&lt;#&gt;</a:t>
             </a:fld>
           </a:p>
@@ -8642,7 +8642,7 @@
         <p:spPr>
           <a:xfrm>
             <a:off x="1167480" y="1122480"/>
-            <a:ext cx="7096320" cy="2386800"/>
+            <a:ext cx="7095960" cy="2386440"/>
           </a:xfrm>
           <a:prstGeom prst="rect">
             <a:avLst/>
@@ -8679,7 +8679,7 @@
         <p:spPr>
           <a:xfrm>
             <a:off x="609480" y="1604520"/>
-            <a:ext cx="10972440" cy="1896840"/>
+            <a:ext cx="10972080" cy="1896840"/>
           </a:xfrm>
           <a:prstGeom prst="rect">
             <a:avLst/>
@@ -8713,7 +8713,7 @@
         <p:spPr>
           <a:xfrm>
             <a:off x="609480" y="3682080"/>
-            <a:ext cx="10972440" cy="1896840"/>
+            <a:ext cx="10972080" cy="1896840"/>
           </a:xfrm>
           <a:prstGeom prst="rect">
             <a:avLst/>
@@ -8768,7 +8768,7 @@
         <p:txBody>
           <a:bodyPr/>
           <a:p>
-            <a:fld id="{D2AFB61A-A011-420F-A39E-65B951EABB70}" type="slidenum">
+            <a:fld id="{4CB85D56-EE93-4FA3-994C-839577E3D044}" type="slidenum">
               <a:t>&lt;#&gt;</a:t>
             </a:fld>
           </a:p>
@@ -8830,7 +8830,7 @@
         <p:spPr>
           <a:xfrm>
             <a:off x="1167480" y="1122480"/>
-            <a:ext cx="7096320" cy="2386800"/>
+            <a:ext cx="7095960" cy="2386440"/>
           </a:xfrm>
           <a:prstGeom prst="rect">
             <a:avLst/>
@@ -9024,7 +9024,7 @@
         <p:txBody>
           <a:bodyPr/>
           <a:p>
-            <a:fld id="{A51D51E5-C6F8-4718-B8AB-9BF7214C1341}" type="slidenum">
+            <a:fld id="{3834500B-66D5-48EC-A8D2-C18CF3AC60A4}" type="slidenum">
               <a:t>&lt;#&gt;</a:t>
             </a:fld>
           </a:p>
@@ -9086,7 +9086,7 @@
         <p:spPr>
           <a:xfrm>
             <a:off x="1167480" y="1122480"/>
-            <a:ext cx="7096320" cy="2386800"/>
+            <a:ext cx="7095960" cy="2386440"/>
           </a:xfrm>
           <a:prstGeom prst="rect">
             <a:avLst/>
@@ -9123,7 +9123,7 @@
         <p:spPr>
           <a:xfrm>
             <a:off x="609480" y="1604520"/>
-            <a:ext cx="3533040" cy="1896840"/>
+            <a:ext cx="3532680" cy="1896840"/>
           </a:xfrm>
           <a:prstGeom prst="rect">
             <a:avLst/>
@@ -9156,8 +9156,8 @@
         </p:nvSpPr>
         <p:spPr>
           <a:xfrm>
-            <a:off x="4319640" y="1604520"/>
-            <a:ext cx="3533040" cy="1896840"/>
+            <a:off x="4319280" y="1604520"/>
+            <a:ext cx="3532680" cy="1896840"/>
           </a:xfrm>
           <a:prstGeom prst="rect">
             <a:avLst/>
@@ -9190,8 +9190,8 @@
         </p:nvSpPr>
         <p:spPr>
           <a:xfrm>
-            <a:off x="8029800" y="1604520"/>
-            <a:ext cx="3533040" cy="1896840"/>
+            <a:off x="8028720" y="1604520"/>
+            <a:ext cx="3532680" cy="1896840"/>
           </a:xfrm>
           <a:prstGeom prst="rect">
             <a:avLst/>
@@ -9225,7 +9225,7 @@
         <p:spPr>
           <a:xfrm>
             <a:off x="609480" y="3682080"/>
-            <a:ext cx="3533040" cy="1896840"/>
+            <a:ext cx="3532680" cy="1896840"/>
           </a:xfrm>
           <a:prstGeom prst="rect">
             <a:avLst/>
@@ -9258,8 +9258,8 @@
         </p:nvSpPr>
         <p:spPr>
           <a:xfrm>
-            <a:off x="4319640" y="3682080"/>
-            <a:ext cx="3533040" cy="1896840"/>
+            <a:off x="4319280" y="3682080"/>
+            <a:ext cx="3532680" cy="1896840"/>
           </a:xfrm>
           <a:prstGeom prst="rect">
             <a:avLst/>
@@ -9292,8 +9292,8 @@
         </p:nvSpPr>
         <p:spPr>
           <a:xfrm>
-            <a:off x="8029800" y="3682080"/>
-            <a:ext cx="3533040" cy="1896840"/>
+            <a:off x="8028720" y="3682080"/>
+            <a:ext cx="3532680" cy="1896840"/>
           </a:xfrm>
           <a:prstGeom prst="rect">
             <a:avLst/>
@@ -9348,7 +9348,7 @@
         <p:txBody>
           <a:bodyPr/>
           <a:p>
-            <a:fld id="{28A117C8-4F28-4BD8-85B7-D4B0E3F3A458}" type="slidenum">
+            <a:fld id="{4D7EFC48-6A01-4E30-B767-E6132EB2845E}" type="slidenum">
               <a:t>&lt;#&gt;</a:t>
             </a:fld>
           </a:p>
@@ -9431,7 +9431,7 @@
         <p:txBody>
           <a:bodyPr/>
           <a:p>
-            <a:fld id="{25470E05-E21C-47DE-81FF-F4C149AF849D}" type="slidenum">
+            <a:fld id="{3049564C-E4C8-4379-8AE5-F6E24E5A9A41}" type="slidenum">
               <a:t>&lt;#&gt;</a:t>
             </a:fld>
           </a:p>
@@ -9493,7 +9493,7 @@
         <p:spPr>
           <a:xfrm>
             <a:off x="1167480" y="1122480"/>
-            <a:ext cx="7096320" cy="2386800"/>
+            <a:ext cx="7095960" cy="2386440"/>
           </a:xfrm>
           <a:prstGeom prst="rect">
             <a:avLst/>
@@ -9552,7 +9552,7 @@
         <p:spPr>
           <a:xfrm>
             <a:off x="1167480" y="1122480"/>
-            <a:ext cx="7096320" cy="2386800"/>
+            <a:ext cx="7095960" cy="2386440"/>
           </a:xfrm>
           <a:prstGeom prst="rect">
             <a:avLst/>
@@ -9589,7 +9589,7 @@
         <p:spPr>
           <a:xfrm>
             <a:off x="609480" y="1604520"/>
-            <a:ext cx="10972440" cy="3977280"/>
+            <a:ext cx="10972080" cy="3976920"/>
           </a:xfrm>
           <a:prstGeom prst="rect">
             <a:avLst/>
@@ -9647,7 +9647,7 @@
         <p:txBody>
           <a:bodyPr/>
           <a:p>
-            <a:fld id="{BDA29540-2F7B-4E7E-A3DD-2C3BF13C2E4F}" type="slidenum">
+            <a:fld id="{FABB4AB5-A79C-455E-BBDA-C21DC9C6EC8F}" type="slidenum">
               <a:t>&lt;#&gt;</a:t>
             </a:fld>
           </a:p>
@@ -9709,7 +9709,7 @@
         <p:spPr>
           <a:xfrm>
             <a:off x="1167480" y="1122480"/>
-            <a:ext cx="7096320" cy="2386800"/>
+            <a:ext cx="7095960" cy="2386440"/>
           </a:xfrm>
           <a:prstGeom prst="rect">
             <a:avLst/>
@@ -9746,7 +9746,7 @@
         <p:spPr>
           <a:xfrm>
             <a:off x="609480" y="1604520"/>
-            <a:ext cx="10972440" cy="3977280"/>
+            <a:ext cx="10972080" cy="3976920"/>
           </a:xfrm>
           <a:prstGeom prst="rect">
             <a:avLst/>
@@ -9801,7 +9801,7 @@
         <p:txBody>
           <a:bodyPr/>
           <a:p>
-            <a:fld id="{0843833B-7D51-45A7-8F72-B1C31A2D4BDD}" type="slidenum">
+            <a:fld id="{918E1BC3-1273-455B-94D5-D21E89D4DA81}" type="slidenum">
               <a:t>&lt;#&gt;</a:t>
             </a:fld>
           </a:p>
@@ -9863,7 +9863,7 @@
         <p:spPr>
           <a:xfrm>
             <a:off x="1167480" y="1122480"/>
-            <a:ext cx="7096320" cy="2386800"/>
+            <a:ext cx="7095960" cy="2386440"/>
           </a:xfrm>
           <a:prstGeom prst="rect">
             <a:avLst/>
@@ -9900,7 +9900,7 @@
         <p:spPr>
           <a:xfrm>
             <a:off x="609480" y="1604520"/>
-            <a:ext cx="5354280" cy="3977280"/>
+            <a:ext cx="5354280" cy="3976920"/>
           </a:xfrm>
           <a:prstGeom prst="rect">
             <a:avLst/>
@@ -9934,7 +9934,7 @@
         <p:spPr>
           <a:xfrm>
             <a:off x="6231960" y="1604520"/>
-            <a:ext cx="5354280" cy="3977280"/>
+            <a:ext cx="5354280" cy="3976920"/>
           </a:xfrm>
           <a:prstGeom prst="rect">
             <a:avLst/>
@@ -9989,7 +9989,7 @@
         <p:txBody>
           <a:bodyPr/>
           <a:p>
-            <a:fld id="{4EBD89F9-5484-4490-8FF1-B69ED2CBA571}" type="slidenum">
+            <a:fld id="{905008F5-90FE-4A8B-94D5-51326C9AA7B0}" type="slidenum">
               <a:t>&lt;#&gt;</a:t>
             </a:fld>
           </a:p>
@@ -10051,7 +10051,7 @@
         <p:spPr>
           <a:xfrm>
             <a:off x="1167480" y="1122480"/>
-            <a:ext cx="7096320" cy="2386800"/>
+            <a:ext cx="7095960" cy="2386440"/>
           </a:xfrm>
           <a:prstGeom prst="rect">
             <a:avLst/>
@@ -10109,7 +10109,7 @@
         <p:txBody>
           <a:bodyPr/>
           <a:p>
-            <a:fld id="{CEBDFD78-A9F7-4956-A678-480E59FA9D27}" type="slidenum">
+            <a:fld id="{D6CBF04A-7D13-46A0-A71B-68ECCA57CD97}" type="slidenum">
               <a:t>&lt;#&gt;</a:t>
             </a:fld>
           </a:p>
@@ -10171,7 +10171,7 @@
         <p:spPr>
           <a:xfrm>
             <a:off x="1167480" y="1122480"/>
-            <a:ext cx="7096320" cy="11064960"/>
+            <a:ext cx="7095960" cy="11063520"/>
           </a:xfrm>
           <a:prstGeom prst="rect">
             <a:avLst/>
@@ -10229,7 +10229,7 @@
         <p:txBody>
           <a:bodyPr/>
           <a:p>
-            <a:fld id="{507F5F51-C947-42A1-83CE-49A985FAE1B2}" type="slidenum">
+            <a:fld id="{FF98F2D1-417C-45BC-9FFF-CAE6A7373EFB}" type="slidenum">
               <a:t>&lt;#&gt;</a:t>
             </a:fld>
           </a:p>
@@ -10291,7 +10291,7 @@
         <p:spPr>
           <a:xfrm>
             <a:off x="1167480" y="1122480"/>
-            <a:ext cx="7096320" cy="2386800"/>
+            <a:ext cx="7095960" cy="2386440"/>
           </a:xfrm>
           <a:prstGeom prst="rect">
             <a:avLst/>
@@ -10362,7 +10362,7 @@
         <p:spPr>
           <a:xfrm>
             <a:off x="6231960" y="1604520"/>
-            <a:ext cx="5354280" cy="3977280"/>
+            <a:ext cx="5354280" cy="3976920"/>
           </a:xfrm>
           <a:prstGeom prst="rect">
             <a:avLst/>
@@ -10451,7 +10451,7 @@
         <p:txBody>
           <a:bodyPr/>
           <a:p>
-            <a:fld id="{10EF5133-9CB8-4B19-A5BB-3F73635C6292}" type="slidenum">
+            <a:fld id="{87568B0D-D791-4A39-AA17-29481E2ADC7C}" type="slidenum">
               <a:t>&lt;#&gt;</a:t>
             </a:fld>
           </a:p>
@@ -10513,7 +10513,7 @@
         <p:spPr>
           <a:xfrm>
             <a:off x="1167480" y="1122480"/>
-            <a:ext cx="7096320" cy="2386800"/>
+            <a:ext cx="7095960" cy="2386440"/>
           </a:xfrm>
           <a:prstGeom prst="rect">
             <a:avLst/>
@@ -10550,7 +10550,7 @@
         <p:spPr>
           <a:xfrm>
             <a:off x="609480" y="1604520"/>
-            <a:ext cx="5354280" cy="3977280"/>
+            <a:ext cx="5354280" cy="3976920"/>
           </a:xfrm>
           <a:prstGeom prst="rect">
             <a:avLst/>
@@ -10673,7 +10673,7 @@
         <p:txBody>
           <a:bodyPr/>
           <a:p>
-            <a:fld id="{B09017AC-7167-4B5C-BC79-9E3B875ED63F}" type="slidenum">
+            <a:fld id="{BF344670-998F-47AF-8E5F-B359424F4F72}" type="slidenum">
               <a:t>&lt;#&gt;</a:t>
             </a:fld>
           </a:p>
@@ -10735,7 +10735,7 @@
         <p:spPr>
           <a:xfrm>
             <a:off x="1167480" y="1122480"/>
-            <a:ext cx="7096320" cy="2386800"/>
+            <a:ext cx="7095960" cy="2386440"/>
           </a:xfrm>
           <a:prstGeom prst="rect">
             <a:avLst/>
@@ -10840,7 +10840,7 @@
         <p:spPr>
           <a:xfrm>
             <a:off x="609480" y="3682080"/>
-            <a:ext cx="10972440" cy="1896840"/>
+            <a:ext cx="10972080" cy="1896840"/>
           </a:xfrm>
           <a:prstGeom prst="rect">
             <a:avLst/>
@@ -10895,7 +10895,7 @@
         <p:txBody>
           <a:bodyPr/>
           <a:p>
-            <a:fld id="{61225ACE-8A0D-4777-88C1-D5DD81EC1F58}" type="slidenum">
+            <a:fld id="{4B4C601A-7525-463E-9A00-FB48F0C94EBF}" type="slidenum">
               <a:t>&lt;#&gt;</a:t>
             </a:fld>
           </a:p>
@@ -10957,7 +10957,7 @@
         <p:spPr>
           <a:xfrm>
             <a:off x="1167480" y="1122480"/>
-            <a:ext cx="7096320" cy="2386800"/>
+            <a:ext cx="7095960" cy="2386440"/>
           </a:xfrm>
           <a:prstGeom prst="rect">
             <a:avLst/>
@@ -10994,7 +10994,7 @@
         <p:spPr>
           <a:xfrm>
             <a:off x="609480" y="1604520"/>
-            <a:ext cx="10972440" cy="1896840"/>
+            <a:ext cx="10972080" cy="1896840"/>
           </a:xfrm>
           <a:prstGeom prst="rect">
             <a:avLst/>
@@ -11028,7 +11028,7 @@
         <p:spPr>
           <a:xfrm>
             <a:off x="609480" y="3682080"/>
-            <a:ext cx="10972440" cy="1896840"/>
+            <a:ext cx="10972080" cy="1896840"/>
           </a:xfrm>
           <a:prstGeom prst="rect">
             <a:avLst/>
@@ -11083,7 +11083,7 @@
         <p:txBody>
           <a:bodyPr/>
           <a:p>
-            <a:fld id="{1C7DEAF8-E1C9-4AD6-B124-1EE20B20D598}" type="slidenum">
+            <a:fld id="{74F2466D-6EE6-4016-9616-B7F6033E0FB8}" type="slidenum">
               <a:t>&lt;#&gt;</a:t>
             </a:fld>
           </a:p>
@@ -11145,7 +11145,7 @@
         <p:spPr>
           <a:xfrm>
             <a:off x="1167480" y="1122480"/>
-            <a:ext cx="7096320" cy="2386800"/>
+            <a:ext cx="7095960" cy="2386440"/>
           </a:xfrm>
           <a:prstGeom prst="rect">
             <a:avLst/>
@@ -11339,7 +11339,7 @@
         <p:txBody>
           <a:bodyPr/>
           <a:p>
-            <a:fld id="{4210020F-86DD-4DD4-AC77-737377B9EE6B}" type="slidenum">
+            <a:fld id="{4646AADF-884D-476B-A041-9C61C7C41152}" type="slidenum">
               <a:t>&lt;#&gt;</a:t>
             </a:fld>
           </a:p>
@@ -11401,7 +11401,7 @@
         <p:spPr>
           <a:xfrm>
             <a:off x="1167480" y="1122480"/>
-            <a:ext cx="7096320" cy="11064960"/>
+            <a:ext cx="7095960" cy="11063520"/>
           </a:xfrm>
           <a:prstGeom prst="rect">
             <a:avLst/>
@@ -11460,7 +11460,7 @@
         <p:spPr>
           <a:xfrm>
             <a:off x="1167480" y="1122480"/>
-            <a:ext cx="7096320" cy="2386800"/>
+            <a:ext cx="7095960" cy="2386440"/>
           </a:xfrm>
           <a:prstGeom prst="rect">
             <a:avLst/>
@@ -11497,7 +11497,7 @@
         <p:spPr>
           <a:xfrm>
             <a:off x="609480" y="1604520"/>
-            <a:ext cx="3533040" cy="1896840"/>
+            <a:ext cx="3532680" cy="1896840"/>
           </a:xfrm>
           <a:prstGeom prst="rect">
             <a:avLst/>
@@ -11530,8 +11530,8 @@
         </p:nvSpPr>
         <p:spPr>
           <a:xfrm>
-            <a:off x="4319640" y="1604520"/>
-            <a:ext cx="3533040" cy="1896840"/>
+            <a:off x="4319280" y="1604520"/>
+            <a:ext cx="3532680" cy="1896840"/>
           </a:xfrm>
           <a:prstGeom prst="rect">
             <a:avLst/>
@@ -11564,8 +11564,8 @@
         </p:nvSpPr>
         <p:spPr>
           <a:xfrm>
-            <a:off x="8029800" y="1604520"/>
-            <a:ext cx="3533040" cy="1896840"/>
+            <a:off x="8028720" y="1604520"/>
+            <a:ext cx="3532680" cy="1896840"/>
           </a:xfrm>
           <a:prstGeom prst="rect">
             <a:avLst/>
@@ -11599,7 +11599,7 @@
         <p:spPr>
           <a:xfrm>
             <a:off x="609480" y="3682080"/>
-            <a:ext cx="3533040" cy="1896840"/>
+            <a:ext cx="3532680" cy="1896840"/>
           </a:xfrm>
           <a:prstGeom prst="rect">
             <a:avLst/>
@@ -11632,8 +11632,8 @@
         </p:nvSpPr>
         <p:spPr>
           <a:xfrm>
-            <a:off x="4319640" y="3682080"/>
-            <a:ext cx="3533040" cy="1896840"/>
+            <a:off x="4319280" y="3682080"/>
+            <a:ext cx="3532680" cy="1896840"/>
           </a:xfrm>
           <a:prstGeom prst="rect">
             <a:avLst/>
@@ -11666,8 +11666,8 @@
         </p:nvSpPr>
         <p:spPr>
           <a:xfrm>
-            <a:off x="8029800" y="3682080"/>
-            <a:ext cx="3533040" cy="1896840"/>
+            <a:off x="8028720" y="3682080"/>
+            <a:ext cx="3532680" cy="1896840"/>
           </a:xfrm>
           <a:prstGeom prst="rect">
             <a:avLst/>
@@ -11722,7 +11722,7 @@
         <p:txBody>
           <a:bodyPr/>
           <a:p>
-            <a:fld id="{C1B7176A-69EC-413D-8CE2-A8A4280A7B1C}" type="slidenum">
+            <a:fld id="{E1CDF167-AE65-4AB7-998B-CBE52B684336}" type="slidenum">
               <a:t>&lt;#&gt;</a:t>
             </a:fld>
           </a:p>
@@ -11784,7 +11784,7 @@
         <p:spPr>
           <a:xfrm>
             <a:off x="1167480" y="1122480"/>
-            <a:ext cx="7096320" cy="2386800"/>
+            <a:ext cx="7095960" cy="2386440"/>
           </a:xfrm>
           <a:prstGeom prst="rect">
             <a:avLst/>
@@ -11855,7 +11855,7 @@
         <p:spPr>
           <a:xfrm>
             <a:off x="6231960" y="1604520"/>
-            <a:ext cx="5354280" cy="3977280"/>
+            <a:ext cx="5354280" cy="3976920"/>
           </a:xfrm>
           <a:prstGeom prst="rect">
             <a:avLst/>
@@ -11945,7 +11945,7 @@
         <p:spPr>
           <a:xfrm>
             <a:off x="1167480" y="1122480"/>
-            <a:ext cx="7096320" cy="2386800"/>
+            <a:ext cx="7095960" cy="2386440"/>
           </a:xfrm>
           <a:prstGeom prst="rect">
             <a:avLst/>
@@ -11982,7 +11982,7 @@
         <p:spPr>
           <a:xfrm>
             <a:off x="609480" y="1604520"/>
-            <a:ext cx="5354280" cy="3977280"/>
+            <a:ext cx="5354280" cy="3976920"/>
           </a:xfrm>
           <a:prstGeom prst="rect">
             <a:avLst/>
@@ -12106,7 +12106,7 @@
         <p:spPr>
           <a:xfrm>
             <a:off x="1167480" y="1122480"/>
-            <a:ext cx="7096320" cy="2386800"/>
+            <a:ext cx="7095960" cy="2386440"/>
           </a:xfrm>
           <a:prstGeom prst="rect">
             <a:avLst/>
@@ -12211,7 +12211,7 @@
         <p:spPr>
           <a:xfrm>
             <a:off x="609480" y="3682080"/>
-            <a:ext cx="10972440" cy="1896840"/>
+            <a:ext cx="10972080" cy="1896840"/>
           </a:xfrm>
           <a:prstGeom prst="rect">
             <a:avLst/>
@@ -12270,7 +12270,7 @@
         <p:spPr>
           <a:xfrm>
             <a:off x="0" y="4572000"/>
-            <a:ext cx="12191400" cy="2285280"/>
+            <a:ext cx="12191040" cy="2284920"/>
           </a:xfrm>
           <a:prstGeom prst="rect">
             <a:avLst/>
@@ -12306,7 +12306,7 @@
         <p:spPr>
           <a:xfrm>
             <a:off x="583920" y="4960080"/>
-            <a:ext cx="1550520" cy="1550520"/>
+            <a:ext cx="1550160" cy="1550160"/>
           </a:xfrm>
           <a:prstGeom prst="ellipse">
             <a:avLst/>
@@ -12344,7 +12344,7 @@
         <p:spPr>
           <a:xfrm>
             <a:off x="0" y="4572000"/>
-            <a:ext cx="1117800" cy="1117800"/>
+            <a:ext cx="1117440" cy="1117440"/>
           </a:xfrm>
           <a:custGeom>
             <a:avLst/>
@@ -12402,7 +12402,7 @@
         <p:spPr>
           <a:xfrm>
             <a:off x="0" y="5739480"/>
-            <a:ext cx="1117800" cy="1117800"/>
+            <a:ext cx="1117440" cy="1117440"/>
           </a:xfrm>
           <a:custGeom>
             <a:avLst/>
@@ -12459,10 +12459,10 @@
         </p:nvGrpSpPr>
         <p:grpSpPr>
           <a:xfrm>
-            <a:off x="8265240" y="-4320"/>
-            <a:ext cx="3926520" cy="3164400"/>
-            <a:chOff x="8265240" y="-4320"/>
-            <a:chExt cx="3926520" cy="3164400"/>
+            <a:off x="8265600" y="-5040"/>
+            <a:ext cx="3925800" cy="3164040"/>
+            <a:chOff x="8265600" y="-5040"/>
+            <a:chExt cx="3925800" cy="3164040"/>
           </a:xfrm>
         </p:grpSpPr>
         <p:sp>
@@ -12473,8 +12473,8 @@
           </p:nvSpPr>
           <p:spPr>
             <a:xfrm flipH="1" flipV="1" rot="5400000">
-              <a:off x="9627480" y="596160"/>
-              <a:ext cx="3164400" cy="1963080"/>
+              <a:off x="9627840" y="595080"/>
+              <a:ext cx="3164040" cy="1962720"/>
             </a:xfrm>
             <a:custGeom>
               <a:avLst/>
@@ -12542,8 +12542,8 @@
           </p:nvSpPr>
           <p:spPr>
             <a:xfrm flipV="1" rot="16200000">
-              <a:off x="7664400" y="596160"/>
-              <a:ext cx="3164400" cy="1963080"/>
+              <a:off x="7664760" y="595080"/>
+              <a:ext cx="3164040" cy="1962720"/>
             </a:xfrm>
             <a:custGeom>
               <a:avLst/>
@@ -12613,7 +12613,7 @@
         <p:spPr>
           <a:xfrm>
             <a:off x="0" y="0"/>
-            <a:ext cx="1166760" cy="1166760"/>
+            <a:ext cx="1166400" cy="1166400"/>
           </a:xfrm>
           <a:custGeom>
             <a:avLst/>
@@ -12671,7 +12671,7 @@
         <p:spPr>
           <a:xfrm>
             <a:off x="11024640" y="4580640"/>
-            <a:ext cx="1166760" cy="2276640"/>
+            <a:ext cx="1166400" cy="2276280"/>
           </a:xfrm>
           <a:custGeom>
             <a:avLst/>
@@ -12754,7 +12754,7 @@
         <p:spPr>
           <a:xfrm>
             <a:off x="1167480" y="1122480"/>
-            <a:ext cx="7096320" cy="2386800"/>
+            <a:ext cx="7095960" cy="2386440"/>
           </a:xfrm>
           <a:prstGeom prst="rect">
             <a:avLst/>
@@ -12794,7 +12794,7 @@
         <p:spPr>
           <a:xfrm>
             <a:off x="609480" y="1604520"/>
-            <a:ext cx="10972440" cy="3977280"/>
+            <a:ext cx="10972080" cy="3976920"/>
           </a:xfrm>
           <a:prstGeom prst="rect">
             <a:avLst/>
@@ -12821,12 +12821,12 @@
               <a:buChar char=""/>
             </a:pPr>
             <a:r>
-              <a:rPr b="0" lang="en-US" sz="3200" spc="-1" strike="noStrike">
+              <a:rPr b="0" lang="en-US" sz="1800" spc="-1" strike="noStrike">
                 <a:latin typeface="Arial"/>
               </a:rPr>
               <a:t>Click to edit the outline text format</a:t>
             </a:r>
-            <a:endParaRPr b="0" lang="en-US" sz="3200" spc="-1" strike="noStrike">
+            <a:endParaRPr b="0" lang="en-US" sz="1800" spc="-1" strike="noStrike">
               <a:latin typeface="Arial"/>
             </a:endParaRPr>
           </a:p>
@@ -12843,12 +12843,12 @@
               <a:buChar char=""/>
             </a:pPr>
             <a:r>
-              <a:rPr b="0" lang="en-US" sz="2800" spc="-1" strike="noStrike">
+              <a:rPr b="0" lang="en-US" sz="1800" spc="-1" strike="noStrike">
                 <a:latin typeface="Arial"/>
               </a:rPr>
               <a:t>Second Outline Level</a:t>
             </a:r>
-            <a:endParaRPr b="0" lang="en-US" sz="2800" spc="-1" strike="noStrike">
+            <a:endParaRPr b="0" lang="en-US" sz="1800" spc="-1" strike="noStrike">
               <a:latin typeface="Arial"/>
             </a:endParaRPr>
           </a:p>
@@ -12865,12 +12865,12 @@
               <a:buChar char=""/>
             </a:pPr>
             <a:r>
-              <a:rPr b="0" lang="en-US" sz="2400" spc="-1" strike="noStrike">
+              <a:rPr b="0" lang="en-US" sz="1800" spc="-1" strike="noStrike">
                 <a:latin typeface="Arial"/>
               </a:rPr>
               <a:t>Third Outline Level</a:t>
             </a:r>
-            <a:endParaRPr b="0" lang="en-US" sz="2400" spc="-1" strike="noStrike">
+            <a:endParaRPr b="0" lang="en-US" sz="1800" spc="-1" strike="noStrike">
               <a:latin typeface="Arial"/>
             </a:endParaRPr>
           </a:p>
@@ -12887,12 +12887,12 @@
               <a:buChar char=""/>
             </a:pPr>
             <a:r>
-              <a:rPr b="0" lang="en-US" sz="2000" spc="-1" strike="noStrike">
+              <a:rPr b="0" lang="en-US" sz="1800" spc="-1" strike="noStrike">
                 <a:latin typeface="Arial"/>
               </a:rPr>
               <a:t>Fourth Outline Level</a:t>
             </a:r>
-            <a:endParaRPr b="0" lang="en-US" sz="2000" spc="-1" strike="noStrike">
+            <a:endParaRPr b="0" lang="en-US" sz="1800" spc="-1" strike="noStrike">
               <a:latin typeface="Arial"/>
             </a:endParaRPr>
           </a:p>
@@ -12909,12 +12909,12 @@
               <a:buChar char=""/>
             </a:pPr>
             <a:r>
-              <a:rPr b="0" lang="en-US" sz="2000" spc="-1" strike="noStrike">
+              <a:rPr b="0" lang="en-US" sz="1800" spc="-1" strike="noStrike">
                 <a:latin typeface="Arial"/>
               </a:rPr>
               <a:t>Fifth Outline Level</a:t>
             </a:r>
-            <a:endParaRPr b="0" lang="en-US" sz="2000" spc="-1" strike="noStrike">
+            <a:endParaRPr b="0" lang="en-US" sz="1800" spc="-1" strike="noStrike">
               <a:latin typeface="Arial"/>
             </a:endParaRPr>
           </a:p>
@@ -12931,12 +12931,12 @@
               <a:buChar char=""/>
             </a:pPr>
             <a:r>
-              <a:rPr b="0" lang="en-US" sz="2000" spc="-1" strike="noStrike">
+              <a:rPr b="0" lang="en-US" sz="1800" spc="-1" strike="noStrike">
                 <a:latin typeface="Arial"/>
               </a:rPr>
               <a:t>Sixth Outline Level</a:t>
             </a:r>
-            <a:endParaRPr b="0" lang="en-US" sz="2000" spc="-1" strike="noStrike">
+            <a:endParaRPr b="0" lang="en-US" sz="1800" spc="-1" strike="noStrike">
               <a:latin typeface="Arial"/>
             </a:endParaRPr>
           </a:p>
@@ -12953,12 +12953,12 @@
               <a:buChar char=""/>
             </a:pPr>
             <a:r>
-              <a:rPr b="0" lang="en-US" sz="2000" spc="-1" strike="noStrike">
+              <a:rPr b="0" lang="en-US" sz="1800" spc="-1" strike="noStrike">
                 <a:latin typeface="Arial"/>
               </a:rPr>
               <a:t>Seventh Outline Level</a:t>
             </a:r>
-            <a:endParaRPr b="0" lang="en-US" sz="2000" spc="-1" strike="noStrike">
+            <a:endParaRPr b="0" lang="en-US" sz="1800" spc="-1" strike="noStrike">
               <a:latin typeface="Arial"/>
             </a:endParaRPr>
           </a:p>
@@ -13016,10 +13016,10 @@
         </p:nvGrpSpPr>
         <p:grpSpPr>
           <a:xfrm>
-            <a:off x="10924200" y="-360"/>
-            <a:ext cx="1267920" cy="1572120"/>
-            <a:chOff x="10924200" y="-360"/>
-            <a:chExt cx="1267920" cy="1572120"/>
+            <a:off x="10923840" y="-360"/>
+            <a:ext cx="1268280" cy="1571760"/>
+            <a:chOff x="10923840" y="-360"/>
+            <a:chExt cx="1268280" cy="1571760"/>
           </a:xfrm>
         </p:grpSpPr>
         <p:sp>
@@ -13030,8 +13030,8 @@
           </p:nvSpPr>
           <p:spPr>
             <a:xfrm flipH="1" flipV="1">
-              <a:off x="10924200" y="0"/>
-              <a:ext cx="1266480" cy="785520"/>
+              <a:off x="10923480" y="-360"/>
+              <a:ext cx="1266120" cy="785160"/>
             </a:xfrm>
             <a:custGeom>
               <a:avLst/>
@@ -13099,8 +13099,8 @@
           </p:nvSpPr>
           <p:spPr>
             <a:xfrm flipV="1" rot="10800000">
-              <a:off x="10925640" y="786240"/>
-              <a:ext cx="1266480" cy="785520"/>
+              <a:off x="10926000" y="785880"/>
+              <a:ext cx="1266120" cy="785160"/>
             </a:xfrm>
             <a:custGeom>
               <a:avLst/>
@@ -13174,7 +13174,7 @@
         <p:spPr>
           <a:xfrm>
             <a:off x="4038480" y="6356520"/>
-            <a:ext cx="4114080" cy="364320"/>
+            <a:ext cx="4113720" cy="363960"/>
           </a:xfrm>
           <a:prstGeom prst="rect">
             <a:avLst/>
@@ -13231,7 +13231,7 @@
         <p:spPr>
           <a:xfrm>
             <a:off x="10153440" y="6356520"/>
-            <a:ext cx="1657080" cy="364320"/>
+            <a:ext cx="1656720" cy="363960"/>
           </a:xfrm>
           <a:prstGeom prst="rect">
             <a:avLst/>
@@ -13266,7 +13266,7 @@
               </a:lnSpc>
               <a:buNone/>
             </a:pPr>
-            <a:fld id="{6423C792-C00B-4F04-9DD7-8FFDB546F236}" type="slidenum">
+            <a:fld id="{70BE66B5-5755-4DA5-8B14-77E882DF3ACB}" type="slidenum">
               <a:rPr b="0" lang="ru-RU" sz="1200" spc="-1" strike="noStrike">
                 <a:solidFill>
                   <a:srgbClr val="637183"/>
@@ -13294,7 +13294,7 @@
         <p:spPr>
           <a:xfrm>
             <a:off x="380880" y="6356520"/>
-            <a:ext cx="1700280" cy="364320"/>
+            <a:ext cx="1699920" cy="363960"/>
           </a:xfrm>
           <a:prstGeom prst="rect">
             <a:avLst/>
@@ -13607,7 +13607,7 @@
         <p:spPr>
           <a:xfrm flipH="1">
             <a:off x="8580240" y="0"/>
-            <a:ext cx="3610440" cy="3610440"/>
+            <a:ext cx="3610080" cy="3610080"/>
           </a:xfrm>
           <a:custGeom>
             <a:avLst/>
@@ -13665,7 +13665,7 @@
         <p:spPr>
           <a:xfrm flipH="1">
             <a:off x="8580240" y="3246840"/>
-            <a:ext cx="3610440" cy="3610440"/>
+            <a:ext cx="3610080" cy="3610080"/>
           </a:xfrm>
           <a:custGeom>
             <a:avLst/>
@@ -13723,7 +13723,7 @@
         <p:spPr>
           <a:xfrm>
             <a:off x="0" y="0"/>
-            <a:ext cx="933120" cy="933120"/>
+            <a:ext cx="932760" cy="932760"/>
           </a:xfrm>
           <a:custGeom>
             <a:avLst/>
@@ -13780,10 +13780,10 @@
         </p:nvGrpSpPr>
         <p:grpSpPr>
           <a:xfrm>
-            <a:off x="8082720" y="5590080"/>
-            <a:ext cx="1571040" cy="1266480"/>
-            <a:chOff x="8082720" y="5590080"/>
-            <a:chExt cx="1571040" cy="1266480"/>
+            <a:off x="8083080" y="5589720"/>
+            <a:ext cx="1570320" cy="1266120"/>
+            <a:chOff x="8083080" y="5589720"/>
+            <a:chExt cx="1570320" cy="1266120"/>
           </a:xfrm>
         </p:grpSpPr>
         <p:sp>
@@ -13794,8 +13794,8 @@
           </p:nvSpPr>
           <p:spPr>
             <a:xfrm flipH="1" flipV="1" rot="5400000">
-              <a:off x="8627760" y="5830560"/>
-              <a:ext cx="1266480" cy="785520"/>
+              <a:off x="8627400" y="5829840"/>
+              <a:ext cx="1266120" cy="785160"/>
             </a:xfrm>
             <a:custGeom>
               <a:avLst/>
@@ -13863,8 +13863,8 @@
           </p:nvSpPr>
           <p:spPr>
             <a:xfrm flipV="1" rot="16200000">
-              <a:off x="7842240" y="5830560"/>
-              <a:ext cx="1266480" cy="785520"/>
+              <a:off x="7842600" y="5829840"/>
+              <a:ext cx="1266120" cy="785160"/>
             </a:xfrm>
             <a:custGeom>
               <a:avLst/>
@@ -13938,7 +13938,7 @@
         <p:spPr>
           <a:xfrm>
             <a:off x="4038480" y="6356520"/>
-            <a:ext cx="4114080" cy="364320"/>
+            <a:ext cx="4113720" cy="363960"/>
           </a:xfrm>
           <a:prstGeom prst="rect">
             <a:avLst/>
@@ -13995,7 +13995,7 @@
         <p:spPr>
           <a:xfrm>
             <a:off x="10153440" y="6356520"/>
-            <a:ext cx="1657080" cy="364320"/>
+            <a:ext cx="1656720" cy="363960"/>
           </a:xfrm>
           <a:prstGeom prst="rect">
             <a:avLst/>
@@ -14030,7 +14030,7 @@
               </a:lnSpc>
               <a:buNone/>
             </a:pPr>
-            <a:fld id="{A590294B-77FB-4D84-95A9-904FAA31BB18}" type="slidenum">
+            <a:fld id="{182C0B82-4159-4063-85D9-7E2D0BF857A0}" type="slidenum">
               <a:rPr b="0" lang="ru-RU" sz="1200" spc="-1" strike="noStrike">
                 <a:solidFill>
                   <a:srgbClr val="dae5ef"/>
@@ -14058,7 +14058,7 @@
         <p:spPr>
           <a:xfrm>
             <a:off x="380880" y="6356520"/>
-            <a:ext cx="2742480" cy="364320"/>
+            <a:ext cx="2742120" cy="363960"/>
           </a:xfrm>
           <a:prstGeom prst="rect">
             <a:avLst/>
@@ -14375,7 +14375,7 @@
         <p:spPr>
           <a:xfrm>
             <a:off x="4038480" y="6356520"/>
-            <a:ext cx="4114080" cy="364320"/>
+            <a:ext cx="4113720" cy="363960"/>
           </a:xfrm>
           <a:prstGeom prst="rect">
             <a:avLst/>
@@ -14432,7 +14432,7 @@
         <p:spPr>
           <a:xfrm>
             <a:off x="9067680" y="6356520"/>
-            <a:ext cx="2742480" cy="364320"/>
+            <a:ext cx="2742120" cy="363960"/>
           </a:xfrm>
           <a:prstGeom prst="rect">
             <a:avLst/>
@@ -14467,7 +14467,7 @@
               </a:lnSpc>
               <a:buNone/>
             </a:pPr>
-            <a:fld id="{314AB8B5-2D97-442B-AB11-714595F9BB39}" type="slidenum">
+            <a:fld id="{01AC66F8-B68A-4EF8-B7D5-DF1E1344E851}" type="slidenum">
               <a:rPr b="0" lang="ru-RU" sz="1200" spc="-1" strike="noStrike">
                 <a:solidFill>
                   <a:srgbClr val="dae5ef"/>
@@ -14495,7 +14495,7 @@
         <p:spPr>
           <a:xfrm>
             <a:off x="380880" y="6356520"/>
-            <a:ext cx="2742480" cy="364320"/>
+            <a:ext cx="2742120" cy="363960"/>
           </a:xfrm>
           <a:prstGeom prst="rect">
             <a:avLst/>
@@ -14808,7 +14808,7 @@
         <p:spPr>
           <a:xfrm flipH="1">
             <a:off x="8580240" y="0"/>
-            <a:ext cx="3610440" cy="3610440"/>
+            <a:ext cx="3610080" cy="3610080"/>
           </a:xfrm>
           <a:custGeom>
             <a:avLst/>
@@ -14865,8 +14865,8 @@
         </p:nvSpPr>
         <p:spPr>
           <a:xfrm flipH="1" rot="5400000">
-            <a:off x="-720" y="3247560"/>
-            <a:ext cx="3610440" cy="3610440"/>
+            <a:off x="-720" y="3247920"/>
+            <a:ext cx="3610080" cy="3610080"/>
           </a:xfrm>
           <a:custGeom>
             <a:avLst/>
@@ -14928,7 +14928,7 @@
         <p:spPr>
           <a:xfrm>
             <a:off x="4038480" y="6356520"/>
-            <a:ext cx="4114080" cy="364320"/>
+            <a:ext cx="4113720" cy="363960"/>
           </a:xfrm>
           <a:prstGeom prst="rect">
             <a:avLst/>
@@ -14985,7 +14985,7 @@
         <p:spPr>
           <a:xfrm>
             <a:off x="10153440" y="6356520"/>
-            <a:ext cx="1657080" cy="364320"/>
+            <a:ext cx="1656720" cy="363960"/>
           </a:xfrm>
           <a:prstGeom prst="rect">
             <a:avLst/>
@@ -15020,7 +15020,7 @@
               </a:lnSpc>
               <a:buNone/>
             </a:pPr>
-            <a:fld id="{1E54AF40-CBB4-4DEB-82CF-BB8F915AC5D8}" type="slidenum">
+            <a:fld id="{E5C0F1EF-2DD3-4A9D-83D0-34157BAAE0A3}" type="slidenum">
               <a:rPr b="0" lang="ru-RU" sz="1200" spc="-1" strike="noStrike">
                 <a:solidFill>
                   <a:srgbClr val="637183"/>
@@ -15048,7 +15048,7 @@
         <p:spPr>
           <a:xfrm>
             <a:off x="380880" y="6356520"/>
-            <a:ext cx="1700280" cy="364320"/>
+            <a:ext cx="1699920" cy="363960"/>
           </a:xfrm>
           <a:prstGeom prst="rect">
             <a:avLst/>
@@ -15358,7 +15358,7 @@
         <p:spPr>
           <a:xfrm>
             <a:off x="1167480" y="1122480"/>
-            <a:ext cx="7096320" cy="2386800"/>
+            <a:ext cx="7095960" cy="2386440"/>
           </a:xfrm>
           <a:prstGeom prst="rect">
             <a:avLst/>
@@ -15407,7 +15407,7 @@
         <p:spPr>
           <a:xfrm>
             <a:off x="1167480" y="3602160"/>
-            <a:ext cx="9499680" cy="806040"/>
+            <a:ext cx="9499320" cy="805680"/>
           </a:xfrm>
           <a:prstGeom prst="rect">
             <a:avLst/>
@@ -15458,7 +15458,7 @@
         <p:spPr>
           <a:xfrm>
             <a:off x="1832040" y="5735520"/>
-            <a:ext cx="9143280" cy="1040400"/>
+            <a:ext cx="9142920" cy="1040040"/>
           </a:xfrm>
           <a:prstGeom prst="rect">
             <a:avLst/>
@@ -15577,7 +15577,7 @@
         <p:spPr>
           <a:xfrm>
             <a:off x="1167480" y="380880"/>
-            <a:ext cx="9778320" cy="1324800"/>
+            <a:ext cx="9777960" cy="1324440"/>
           </a:xfrm>
           <a:prstGeom prst="rect">
             <a:avLst/>
@@ -15626,7 +15626,7 @@
         <p:spPr>
           <a:xfrm>
             <a:off x="10153440" y="6356520"/>
-            <a:ext cx="1657080" cy="364320"/>
+            <a:ext cx="1656720" cy="363960"/>
           </a:xfrm>
           <a:prstGeom prst="rect">
             <a:avLst/>
@@ -15661,7 +15661,7 @@
               </a:lnSpc>
               <a:buNone/>
             </a:pPr>
-            <a:fld id="{07701E5E-6421-458F-9BA9-542297A27B45}" type="slidenum">
+            <a:fld id="{29C199EB-A188-4D95-9F72-83B82125BA1B}" type="slidenum">
               <a:rPr b="0" lang="ru-RU" sz="2800" spc="-1" strike="noStrike">
                 <a:solidFill>
                   <a:srgbClr val="637183"/>
@@ -15689,7 +15689,7 @@
         <p:spPr>
           <a:xfrm>
             <a:off x="2878560" y="2157120"/>
-            <a:ext cx="2071800" cy="4319280"/>
+            <a:ext cx="2071440" cy="4318920"/>
           </a:xfrm>
           <a:prstGeom prst="rect">
             <a:avLst/>
@@ -15712,7 +15712,7 @@
         <p:spPr>
           <a:xfrm>
             <a:off x="5059800" y="2157120"/>
-            <a:ext cx="2071800" cy="4319280"/>
+            <a:ext cx="2071440" cy="4318920"/>
           </a:xfrm>
           <a:prstGeom prst="rect">
             <a:avLst/>
@@ -15735,7 +15735,7 @@
         <p:spPr>
           <a:xfrm>
             <a:off x="7241040" y="2157120"/>
-            <a:ext cx="2043360" cy="4319280"/>
+            <a:ext cx="2043000" cy="4318920"/>
           </a:xfrm>
           <a:prstGeom prst="rect">
             <a:avLst/>
@@ -15788,7 +15788,7 @@
         <p:spPr>
           <a:xfrm>
             <a:off x="1167480" y="380880"/>
-            <a:ext cx="9778320" cy="1324800"/>
+            <a:ext cx="9777960" cy="1324440"/>
           </a:xfrm>
           <a:prstGeom prst="rect">
             <a:avLst/>
@@ -15837,7 +15837,7 @@
         <p:spPr>
           <a:xfrm>
             <a:off x="10153440" y="6356520"/>
-            <a:ext cx="1657080" cy="364320"/>
+            <a:ext cx="1656720" cy="363960"/>
           </a:xfrm>
           <a:prstGeom prst="rect">
             <a:avLst/>
@@ -15872,7 +15872,7 @@
               </a:lnSpc>
               <a:buNone/>
             </a:pPr>
-            <a:fld id="{BD7AB1B3-03BD-4AC2-ABD3-1B647CBB4F80}" type="slidenum">
+            <a:fld id="{A28F1A98-CBB0-4849-8610-08CDCA879FFB}" type="slidenum">
               <a:rPr b="0" lang="ru-RU" sz="2800" spc="-1" strike="noStrike">
                 <a:solidFill>
                   <a:srgbClr val="637183"/>
@@ -15900,7 +15900,7 @@
         <p:spPr>
           <a:xfrm>
             <a:off x="2949480" y="2157120"/>
-            <a:ext cx="2044080" cy="4319280"/>
+            <a:ext cx="2043720" cy="4318920"/>
           </a:xfrm>
           <a:prstGeom prst="rect">
             <a:avLst/>
@@ -15923,7 +15923,7 @@
         <p:spPr>
           <a:xfrm>
             <a:off x="5073480" y="2157120"/>
-            <a:ext cx="2044080" cy="4319280"/>
+            <a:ext cx="2043720" cy="4318920"/>
           </a:xfrm>
           <a:prstGeom prst="rect">
             <a:avLst/>
@@ -15946,7 +15946,7 @@
         <p:spPr>
           <a:xfrm>
             <a:off x="7197840" y="2147400"/>
-            <a:ext cx="2040120" cy="4319280"/>
+            <a:ext cx="2039760" cy="4318920"/>
           </a:xfrm>
           <a:prstGeom prst="rect">
             <a:avLst/>
@@ -15999,7 +15999,7 @@
         <p:spPr>
           <a:xfrm>
             <a:off x="1167480" y="380880"/>
-            <a:ext cx="9778320" cy="1324800"/>
+            <a:ext cx="9777960" cy="1324440"/>
           </a:xfrm>
           <a:prstGeom prst="rect">
             <a:avLst/>
@@ -16048,7 +16048,7 @@
         <p:spPr>
           <a:xfrm>
             <a:off x="10153440" y="6356520"/>
-            <a:ext cx="1657080" cy="364320"/>
+            <a:ext cx="1656720" cy="363960"/>
           </a:xfrm>
           <a:prstGeom prst="rect">
             <a:avLst/>
@@ -16083,7 +16083,7 @@
               </a:lnSpc>
               <a:buNone/>
             </a:pPr>
-            <a:fld id="{C9CFEE63-9166-4380-80F7-CFD4DCE15862}" type="slidenum">
+            <a:fld id="{9830E2AF-B6D5-4F52-B1B4-7A938E9E29A6}" type="slidenum">
               <a:rPr b="0" lang="ru-RU" sz="2800" spc="-1" strike="noStrike">
                 <a:solidFill>
                   <a:srgbClr val="637183"/>
@@ -16111,7 +16111,7 @@
         <p:spPr>
           <a:xfrm>
             <a:off x="1989720" y="2157120"/>
-            <a:ext cx="2072520" cy="4319280"/>
+            <a:ext cx="2072160" cy="4318920"/>
           </a:xfrm>
           <a:prstGeom prst="rect">
             <a:avLst/>
@@ -16134,7 +16134,7 @@
         <p:spPr>
           <a:xfrm>
             <a:off x="6279120" y="2157120"/>
-            <a:ext cx="2072520" cy="4319280"/>
+            <a:ext cx="2072160" cy="4318920"/>
           </a:xfrm>
           <a:prstGeom prst="rect">
             <a:avLst/>
@@ -16157,7 +16157,7 @@
         <p:spPr>
           <a:xfrm>
             <a:off x="4134240" y="2157120"/>
-            <a:ext cx="2073240" cy="4319280"/>
+            <a:ext cx="2072880" cy="4318920"/>
           </a:xfrm>
           <a:prstGeom prst="rect">
             <a:avLst/>
@@ -16180,7 +16180,7 @@
         <p:spPr>
           <a:xfrm>
             <a:off x="8432280" y="2157120"/>
-            <a:ext cx="1995840" cy="4319280"/>
+            <a:ext cx="1995480" cy="4318920"/>
           </a:xfrm>
           <a:prstGeom prst="rect">
             <a:avLst/>
@@ -16235,7 +16235,7 @@
         <p:spPr>
           <a:xfrm>
             <a:off x="1167480" y="380880"/>
-            <a:ext cx="9778320" cy="1324800"/>
+            <a:ext cx="9777960" cy="1324440"/>
           </a:xfrm>
           <a:prstGeom prst="rect">
             <a:avLst/>
@@ -16284,7 +16284,7 @@
         <p:spPr>
           <a:xfrm>
             <a:off x="10153440" y="6356520"/>
-            <a:ext cx="1657080" cy="364320"/>
+            <a:ext cx="1656720" cy="363960"/>
           </a:xfrm>
           <a:prstGeom prst="rect">
             <a:avLst/>
@@ -16319,7 +16319,7 @@
               </a:lnSpc>
               <a:buNone/>
             </a:pPr>
-            <a:fld id="{770CFDBA-309E-4444-9060-9517E35E7B4B}" type="slidenum">
+            <a:fld id="{12FB1329-C19F-47ED-B12B-2C937DA57514}" type="slidenum">
               <a:rPr b="0" lang="ru-RU" sz="2800" spc="-1" strike="noStrike">
                 <a:solidFill>
                   <a:srgbClr val="637183"/>
@@ -16347,7 +16347,7 @@
         <p:spPr>
           <a:xfrm>
             <a:off x="5059440" y="2036520"/>
-            <a:ext cx="2072520" cy="4319280"/>
+            <a:ext cx="2072160" cy="4318920"/>
           </a:xfrm>
           <a:prstGeom prst="rect">
             <a:avLst/>
@@ -16400,7 +16400,7 @@
         <p:spPr>
           <a:xfrm>
             <a:off x="1167480" y="380880"/>
-            <a:ext cx="9778320" cy="1324800"/>
+            <a:ext cx="9777960" cy="1324440"/>
           </a:xfrm>
           <a:prstGeom prst="rect">
             <a:avLst/>
@@ -16449,7 +16449,7 @@
         <p:spPr>
           <a:xfrm>
             <a:off x="1167480" y="2017440"/>
-            <a:ext cx="9778320" cy="3366000"/>
+            <a:ext cx="9777960" cy="3365640"/>
           </a:xfrm>
           <a:prstGeom prst="rect">
             <a:avLst/>
@@ -16672,7 +16672,7 @@
         <p:spPr>
           <a:xfrm>
             <a:off x="10153440" y="6356520"/>
-            <a:ext cx="1657080" cy="364320"/>
+            <a:ext cx="1656720" cy="363960"/>
           </a:xfrm>
           <a:prstGeom prst="rect">
             <a:avLst/>
@@ -16707,7 +16707,7 @@
               </a:lnSpc>
               <a:buNone/>
             </a:pPr>
-            <a:fld id="{6E2AE7D2-68ED-43E2-9DFC-54770CC70EE3}" type="slidenum">
+            <a:fld id="{350F902B-A2B7-4BF9-8457-ACCCC3883B45}" type="slidenum">
               <a:rPr b="0" lang="ru-RU" sz="2800" spc="-1" strike="noStrike">
                 <a:solidFill>
                   <a:srgbClr val="dae5ef"/>
@@ -16765,7 +16765,7 @@
         <p:spPr>
           <a:xfrm>
             <a:off x="4572000" y="2793960"/>
-            <a:ext cx="2463480" cy="2463480"/>
+            <a:ext cx="2463120" cy="2463120"/>
           </a:xfrm>
           <a:prstGeom prst="rect">
             <a:avLst/>
@@ -16784,7 +16784,7 @@
         <p:spPr>
           <a:xfrm>
             <a:off x="1143000" y="457200"/>
-            <a:ext cx="9778320" cy="1324800"/>
+            <a:ext cx="9777960" cy="1324440"/>
           </a:xfrm>
           <a:prstGeom prst="rect">
             <a:avLst/>
@@ -16817,6 +16817,7 @@
                   <a:srgbClr val="000000"/>
                 </a:solidFill>
                 <a:latin typeface="Times New Roman"/>
+                <a:ea typeface="DejaVu Sans"/>
               </a:rPr>
               <a:t>Ссылка на репозиторий</a:t>
             </a:r>
@@ -16869,7 +16870,7 @@
         <p:spPr>
           <a:xfrm>
             <a:off x="1167480" y="1122480"/>
-            <a:ext cx="7096320" cy="2386800"/>
+            <a:ext cx="7095960" cy="2386440"/>
           </a:xfrm>
           <a:prstGeom prst="rect">
             <a:avLst/>
@@ -16918,7 +16919,7 @@
         <p:spPr>
           <a:xfrm>
             <a:off x="1167480" y="3602160"/>
-            <a:ext cx="9499680" cy="806040"/>
+            <a:ext cx="9499320" cy="805680"/>
           </a:xfrm>
           <a:prstGeom prst="rect">
             <a:avLst/>
@@ -16969,7 +16970,7 @@
         <p:spPr>
           <a:xfrm>
             <a:off x="1832040" y="5735520"/>
-            <a:ext cx="9143280" cy="1040400"/>
+            <a:ext cx="9142920" cy="1040040"/>
           </a:xfrm>
           <a:prstGeom prst="rect">
             <a:avLst/>
@@ -17088,7 +17089,7 @@
         <p:spPr>
           <a:xfrm>
             <a:off x="1167480" y="380880"/>
-            <a:ext cx="9778320" cy="1324800"/>
+            <a:ext cx="9777960" cy="1324440"/>
           </a:xfrm>
           <a:prstGeom prst="rect">
             <a:avLst/>
@@ -17588,6 +17589,30 @@
                         <a:latin typeface="Arial"/>
                       </a:endParaRPr>
                     </a:p>
+                    <a:p>
+                      <a:pPr marL="457200" indent="-457200">
+                        <a:lnSpc>
+                          <a:spcPct val="100000"/>
+                        </a:lnSpc>
+                        <a:buClr>
+                          <a:srgbClr val="000000"/>
+                        </a:buClr>
+                        <a:buFont typeface="Times New Roman"/>
+                        <a:buChar char="‣"/>
+                      </a:pPr>
+                      <a:r>
+                        <a:rPr b="0" lang="ru-RU" sz="2400" spc="-1" strike="noStrike">
+                          <a:solidFill>
+                            <a:srgbClr val="000000"/>
+                          </a:solidFill>
+                          <a:latin typeface="Times New Roman"/>
+                        </a:rPr>
+                        <a:t>Ведение документации</a:t>
+                      </a:r>
+                      <a:endParaRPr b="0" lang="en-US" sz="2400" spc="-1" strike="noStrike">
+                        <a:latin typeface="Arial"/>
+                      </a:endParaRPr>
+                    </a:p>
                   </a:txBody>
                   <a:tcPr anchor="ctr" marL="91440" marR="91440">
                     <a:lnL w="12240">
@@ -17633,7 +17658,7 @@
         <p:spPr>
           <a:xfrm>
             <a:off x="10153440" y="6356520"/>
-            <a:ext cx="1657080" cy="364320"/>
+            <a:ext cx="1656720" cy="363960"/>
           </a:xfrm>
           <a:prstGeom prst="rect">
             <a:avLst/>
@@ -17668,7 +17693,7 @@
               </a:lnSpc>
               <a:buNone/>
             </a:pPr>
-            <a:fld id="{2AD6F408-442F-440A-84CA-60E22C64B8F3}" type="slidenum">
+            <a:fld id="{A8F0B707-F90F-4997-9088-E31858D846B6}" type="slidenum">
               <a:rPr b="0" lang="ru-RU" sz="2800" spc="-1" strike="noStrike">
                 <a:solidFill>
                   <a:srgbClr val="000000"/>
@@ -17726,7 +17751,7 @@
         <p:spPr>
           <a:xfrm>
             <a:off x="1167480" y="380880"/>
-            <a:ext cx="9778320" cy="1324800"/>
+            <a:ext cx="9777960" cy="1324440"/>
           </a:xfrm>
           <a:prstGeom prst="rect">
             <a:avLst/>
@@ -17775,7 +17800,7 @@
         <p:spPr>
           <a:xfrm>
             <a:off x="1167480" y="2017440"/>
-            <a:ext cx="9778320" cy="3366000"/>
+            <a:ext cx="9777960" cy="3365640"/>
           </a:xfrm>
           <a:prstGeom prst="rect">
             <a:avLst/>
@@ -17885,7 +17910,7 @@
         <p:spPr>
           <a:xfrm>
             <a:off x="10153440" y="6356520"/>
-            <a:ext cx="1657080" cy="364320"/>
+            <a:ext cx="1656720" cy="363960"/>
           </a:xfrm>
           <a:prstGeom prst="rect">
             <a:avLst/>
@@ -17920,7 +17945,7 @@
               </a:lnSpc>
               <a:buNone/>
             </a:pPr>
-            <a:fld id="{087F8762-F699-4415-A357-3C646948BF4B}" type="slidenum">
+            <a:fld id="{1132423F-1170-4647-B4E8-2FD297AD152B}" type="slidenum">
               <a:rPr b="0" lang="ru-RU" sz="3200" spc="-1" strike="noStrike">
                 <a:solidFill>
                   <a:srgbClr val="dae5ef"/>
@@ -17978,7 +18003,7 @@
         <p:spPr>
           <a:xfrm>
             <a:off x="1167480" y="380880"/>
-            <a:ext cx="9778320" cy="1324800"/>
+            <a:ext cx="9777960" cy="1324440"/>
           </a:xfrm>
           <a:prstGeom prst="rect">
             <a:avLst/>
@@ -18027,7 +18052,7 @@
         <p:spPr>
           <a:xfrm>
             <a:off x="1167480" y="2017440"/>
-            <a:ext cx="9778320" cy="3366000"/>
+            <a:ext cx="9777960" cy="3365640"/>
           </a:xfrm>
           <a:prstGeom prst="rect">
             <a:avLst/>
@@ -18099,7 +18124,7 @@
         <p:spPr>
           <a:xfrm>
             <a:off x="10153440" y="6356520"/>
-            <a:ext cx="1657080" cy="364320"/>
+            <a:ext cx="1656720" cy="363960"/>
           </a:xfrm>
           <a:prstGeom prst="rect">
             <a:avLst/>
@@ -18134,7 +18159,7 @@
               </a:lnSpc>
               <a:buNone/>
             </a:pPr>
-            <a:fld id="{5ADE89E6-33F8-4593-813F-B8B8E69E61B0}" type="slidenum">
+            <a:fld id="{16B71E51-894A-47F0-B453-3BF291308D17}" type="slidenum">
               <a:rPr b="0" lang="ru-RU" sz="2800" spc="-1" strike="noStrike">
                 <a:solidFill>
                   <a:srgbClr val="dae5ef"/>
@@ -18192,7 +18217,7 @@
         <p:spPr>
           <a:xfrm>
             <a:off x="1167480" y="380880"/>
-            <a:ext cx="9778320" cy="1324800"/>
+            <a:ext cx="9777960" cy="1324440"/>
           </a:xfrm>
           <a:prstGeom prst="rect">
             <a:avLst/>
@@ -18241,7 +18266,7 @@
         <p:spPr>
           <a:xfrm>
             <a:off x="1167480" y="2017440"/>
-            <a:ext cx="9778320" cy="3366000"/>
+            <a:ext cx="9777960" cy="3365640"/>
           </a:xfrm>
           <a:prstGeom prst="rect">
             <a:avLst/>
@@ -18446,7 +18471,7 @@
         <p:spPr>
           <a:xfrm>
             <a:off x="10153440" y="6356520"/>
-            <a:ext cx="1657080" cy="364320"/>
+            <a:ext cx="1656720" cy="363960"/>
           </a:xfrm>
           <a:prstGeom prst="rect">
             <a:avLst/>
@@ -18481,7 +18506,7 @@
               </a:lnSpc>
               <a:buNone/>
             </a:pPr>
-            <a:fld id="{CBA14F45-F95E-4148-8FBB-0B7C58EB24EA}" type="slidenum">
+            <a:fld id="{EDA7B90D-51E3-4266-9B4A-2C08FC7447DC}" type="slidenum">
               <a:rPr b="0" lang="ru-RU" sz="2800" spc="-1" strike="noStrike">
                 <a:solidFill>
                   <a:srgbClr val="dae5ef"/>
@@ -18539,7 +18564,7 @@
         <p:spPr>
           <a:xfrm>
             <a:off x="1167480" y="380880"/>
-            <a:ext cx="9778320" cy="1324800"/>
+            <a:ext cx="9777960" cy="1324440"/>
           </a:xfrm>
           <a:prstGeom prst="rect">
             <a:avLst/>
@@ -18588,7 +18613,7 @@
         <p:spPr>
           <a:xfrm>
             <a:off x="10153440" y="6356520"/>
-            <a:ext cx="1657080" cy="364320"/>
+            <a:ext cx="1656720" cy="363960"/>
           </a:xfrm>
           <a:prstGeom prst="rect">
             <a:avLst/>
@@ -18623,7 +18648,7 @@
               </a:lnSpc>
               <a:buNone/>
             </a:pPr>
-            <a:fld id="{6F58EC71-39A0-460E-8053-FDA3B4481A24}" type="slidenum">
+            <a:fld id="{4E148D57-D432-4DD8-AF14-1EC021286676}" type="slidenum">
               <a:rPr b="0" lang="ru-RU" sz="2800" spc="-1" strike="noStrike">
                 <a:solidFill>
                   <a:srgbClr val="637183"/>
@@ -20267,7 +20292,7 @@
         <p:spPr>
           <a:xfrm>
             <a:off x="1167480" y="380880"/>
-            <a:ext cx="9778320" cy="1324800"/>
+            <a:ext cx="9777960" cy="1324440"/>
           </a:xfrm>
           <a:prstGeom prst="rect">
             <a:avLst/>
@@ -20316,7 +20341,7 @@
         <p:spPr>
           <a:xfrm>
             <a:off x="1167480" y="2017440"/>
-            <a:ext cx="9778320" cy="3366000"/>
+            <a:ext cx="9777960" cy="3365640"/>
           </a:xfrm>
           <a:prstGeom prst="rect">
             <a:avLst/>
@@ -20380,7 +20405,7 @@
         <p:spPr>
           <a:xfrm>
             <a:off x="10153440" y="6356520"/>
-            <a:ext cx="1657080" cy="364320"/>
+            <a:ext cx="1656720" cy="363960"/>
           </a:xfrm>
           <a:prstGeom prst="rect">
             <a:avLst/>
@@ -20415,7 +20440,7 @@
               </a:lnSpc>
               <a:buNone/>
             </a:pPr>
-            <a:fld id="{38A8C10E-DBD8-4BE7-ACA0-A44F9FC359F0}" type="slidenum">
+            <a:fld id="{A1DBEDE4-A260-4442-9B0F-945C582C86DE}" type="slidenum">
               <a:rPr b="0" lang="ru-RU" sz="2800" spc="-1" strike="noStrike">
                 <a:solidFill>
                   <a:srgbClr val="dae5ef"/>
@@ -20443,7 +20468,7 @@
         <p:spPr>
           <a:xfrm>
             <a:off x="2246400" y="3009240"/>
-            <a:ext cx="7698600" cy="2028240"/>
+            <a:ext cx="7698240" cy="2027880"/>
           </a:xfrm>
           <a:prstGeom prst="rect">
             <a:avLst/>
@@ -20496,7 +20521,7 @@
         <p:spPr>
           <a:xfrm>
             <a:off x="1167480" y="380880"/>
-            <a:ext cx="9778320" cy="1324800"/>
+            <a:ext cx="9777960" cy="1324440"/>
           </a:xfrm>
           <a:prstGeom prst="rect">
             <a:avLst/>
@@ -20545,7 +20570,7 @@
         <p:spPr>
           <a:xfrm>
             <a:off x="10153440" y="6356520"/>
-            <a:ext cx="1657080" cy="364320"/>
+            <a:ext cx="1656720" cy="363960"/>
           </a:xfrm>
           <a:prstGeom prst="rect">
             <a:avLst/>
@@ -20580,7 +20605,7 @@
               </a:lnSpc>
               <a:buNone/>
             </a:pPr>
-            <a:fld id="{F2C014AB-2ACA-4E30-B879-ED9CE0661233}" type="slidenum">
+            <a:fld id="{0AD304D3-2CD2-4F87-A214-1C0DC32F2C3D}" type="slidenum">
               <a:rPr b="0" lang="ru-RU" sz="2800" spc="-1" strike="noStrike">
                 <a:solidFill>
                   <a:srgbClr val="dae5ef"/>
@@ -20604,7 +20629,7 @@
         <p:spPr>
           <a:xfrm>
             <a:off x="1167480" y="3052800"/>
-            <a:ext cx="2722320" cy="1796040"/>
+            <a:ext cx="2721960" cy="1796040"/>
           </a:xfrm>
           <a:prstGeom prst="rect">
             <a:avLst/>
@@ -20741,7 +20766,7 @@
         <p:spPr>
           <a:xfrm>
             <a:off x="4312440" y="3052800"/>
-            <a:ext cx="3157200" cy="3075840"/>
+            <a:ext cx="3156840" cy="3075840"/>
           </a:xfrm>
           <a:prstGeom prst="rect">
             <a:avLst/>
@@ -20928,7 +20953,7 @@
         <p:spPr>
           <a:xfrm>
             <a:off x="7892640" y="3052800"/>
-            <a:ext cx="2950200" cy="1796040"/>
+            <a:ext cx="2949840" cy="1796040"/>
           </a:xfrm>
           <a:prstGeom prst="rect">
             <a:avLst/>
@@ -21019,7 +21044,7 @@
         <p:spPr>
           <a:xfrm>
             <a:off x="1167480" y="2332800"/>
-            <a:ext cx="719280" cy="719280"/>
+            <a:ext cx="718920" cy="718920"/>
           </a:xfrm>
           <a:prstGeom prst="rect">
             <a:avLst/>
@@ -21042,7 +21067,7 @@
         <p:spPr>
           <a:xfrm>
             <a:off x="7892640" y="2332800"/>
-            <a:ext cx="719280" cy="719280"/>
+            <a:ext cx="718920" cy="718920"/>
           </a:xfrm>
           <a:prstGeom prst="rect">
             <a:avLst/>
@@ -21065,7 +21090,7 @@
         <p:spPr>
           <a:xfrm>
             <a:off x="4312440" y="2332800"/>
-            <a:ext cx="719280" cy="719280"/>
+            <a:ext cx="718920" cy="718920"/>
           </a:xfrm>
           <a:prstGeom prst="rect">
             <a:avLst/>
@@ -21118,7 +21143,7 @@
         <p:spPr>
           <a:xfrm>
             <a:off x="1798560" y="1684440"/>
-            <a:ext cx="8593920" cy="2809800"/>
+            <a:ext cx="8593560" cy="2809440"/>
           </a:xfrm>
           <a:prstGeom prst="rect">
             <a:avLst/>
@@ -21167,7 +21192,7 @@
         <p:spPr>
           <a:xfrm>
             <a:off x="9067680" y="6356520"/>
-            <a:ext cx="2742480" cy="364320"/>
+            <a:ext cx="2742120" cy="363960"/>
           </a:xfrm>
           <a:prstGeom prst="rect">
             <a:avLst/>
@@ -21202,7 +21227,7 @@
               </a:lnSpc>
               <a:buNone/>
             </a:pPr>
-            <a:fld id="{325E8EEA-72DD-454E-959A-D80C815EF61D}" type="slidenum">
+            <a:fld id="{39038C7D-CE18-452B-B379-042F67669DA1}" type="slidenum">
               <a:rPr b="0" lang="ru-RU" sz="3200" spc="-1" strike="noStrike">
                 <a:solidFill>
                   <a:srgbClr val="dae5ef"/>

</xml_diff>